<commit_message>
Modified presentation, add drawio diagram.
</commit_message>
<xml_diff>
--- a/Backprophet.pptx
+++ b/Backprophet.pptx
@@ -8,25 +8,29 @@
     <p:sldId id="256" r:id="rId2"/>
     <p:sldId id="257" r:id="rId3"/>
     <p:sldId id="260" r:id="rId4"/>
-    <p:sldId id="261" r:id="rId5"/>
-    <p:sldId id="274" r:id="rId6"/>
-    <p:sldId id="275" r:id="rId7"/>
-    <p:sldId id="262" r:id="rId8"/>
-    <p:sldId id="273" r:id="rId9"/>
-    <p:sldId id="276" r:id="rId10"/>
-    <p:sldId id="277" r:id="rId11"/>
-    <p:sldId id="258" r:id="rId12"/>
-    <p:sldId id="270" r:id="rId13"/>
-    <p:sldId id="271" r:id="rId14"/>
-    <p:sldId id="268" r:id="rId15"/>
-    <p:sldId id="269" r:id="rId16"/>
-    <p:sldId id="267" r:id="rId17"/>
-    <p:sldId id="259" r:id="rId18"/>
-    <p:sldId id="263" r:id="rId19"/>
-    <p:sldId id="264" r:id="rId20"/>
-    <p:sldId id="265" r:id="rId21"/>
-    <p:sldId id="266" r:id="rId22"/>
-    <p:sldId id="272" r:id="rId23"/>
+    <p:sldId id="282" r:id="rId5"/>
+    <p:sldId id="261" r:id="rId6"/>
+    <p:sldId id="274" r:id="rId7"/>
+    <p:sldId id="275" r:id="rId8"/>
+    <p:sldId id="262" r:id="rId9"/>
+    <p:sldId id="273" r:id="rId10"/>
+    <p:sldId id="276" r:id="rId11"/>
+    <p:sldId id="277" r:id="rId12"/>
+    <p:sldId id="258" r:id="rId13"/>
+    <p:sldId id="270" r:id="rId14"/>
+    <p:sldId id="271" r:id="rId15"/>
+    <p:sldId id="268" r:id="rId16"/>
+    <p:sldId id="269" r:id="rId17"/>
+    <p:sldId id="267" r:id="rId18"/>
+    <p:sldId id="259" r:id="rId19"/>
+    <p:sldId id="263" r:id="rId20"/>
+    <p:sldId id="264" r:id="rId21"/>
+    <p:sldId id="265" r:id="rId22"/>
+    <p:sldId id="266" r:id="rId23"/>
+    <p:sldId id="272" r:id="rId24"/>
+    <p:sldId id="278" r:id="rId25"/>
+    <p:sldId id="280" r:id="rId26"/>
+    <p:sldId id="281" r:id="rId27"/>
   </p:sldIdLst>
   <p:sldSz cx="12192000" cy="6858000"/>
   <p:notesSz cx="6858000" cy="9144000"/>
@@ -125,6 +129,11 @@
       </a:defRPr>
     </a:lvl9pPr>
   </p:defaultTextStyle>
+  <p:extLst>
+    <p:ext uri="{EFAFB233-063F-42B5-8137-9DF3F51BA10A}">
+      <p15:sldGuideLst xmlns:p15="http://schemas.microsoft.com/office/powerpoint/2012/main"/>
+    </p:ext>
+  </p:extLst>
 </p:presentation>
 </file>
 
@@ -329,7 +338,7 @@
           <a:p>
             <a:fld id="{11E07752-41DA-40B8-9FE8-052DE1AB6C24}" type="slidenum">
               <a:rPr lang="en-US" smtClean="0"/>
-              <a:t>‹#›</a:t>
+              <a:t>‹Nr.›</a:t>
             </a:fld>
             <a:endParaRPr lang="en-US"/>
           </a:p>
@@ -527,7 +536,7 @@
           <a:p>
             <a:fld id="{11E07752-41DA-40B8-9FE8-052DE1AB6C24}" type="slidenum">
               <a:rPr lang="en-US" smtClean="0"/>
-              <a:t>‹#›</a:t>
+              <a:t>‹Nr.›</a:t>
             </a:fld>
             <a:endParaRPr lang="en-US"/>
           </a:p>
@@ -735,7 +744,7 @@
           <a:p>
             <a:fld id="{11E07752-41DA-40B8-9FE8-052DE1AB6C24}" type="slidenum">
               <a:rPr lang="en-US" smtClean="0"/>
-              <a:t>‹#›</a:t>
+              <a:t>‹Nr.›</a:t>
             </a:fld>
             <a:endParaRPr lang="en-US"/>
           </a:p>
@@ -933,7 +942,7 @@
           <a:p>
             <a:fld id="{11E07752-41DA-40B8-9FE8-052DE1AB6C24}" type="slidenum">
               <a:rPr lang="en-US" smtClean="0"/>
-              <a:t>‹#›</a:t>
+              <a:t>‹Nr.›</a:t>
             </a:fld>
             <a:endParaRPr lang="en-US"/>
           </a:p>
@@ -1208,7 +1217,7 @@
           <a:p>
             <a:fld id="{11E07752-41DA-40B8-9FE8-052DE1AB6C24}" type="slidenum">
               <a:rPr lang="en-US" smtClean="0"/>
-              <a:t>‹#›</a:t>
+              <a:t>‹Nr.›</a:t>
             </a:fld>
             <a:endParaRPr lang="en-US"/>
           </a:p>
@@ -1473,7 +1482,7 @@
           <a:p>
             <a:fld id="{11E07752-41DA-40B8-9FE8-052DE1AB6C24}" type="slidenum">
               <a:rPr lang="en-US" smtClean="0"/>
-              <a:t>‹#›</a:t>
+              <a:t>‹Nr.›</a:t>
             </a:fld>
             <a:endParaRPr lang="en-US"/>
           </a:p>
@@ -1885,7 +1894,7 @@
           <a:p>
             <a:fld id="{11E07752-41DA-40B8-9FE8-052DE1AB6C24}" type="slidenum">
               <a:rPr lang="en-US" smtClean="0"/>
-              <a:t>‹#›</a:t>
+              <a:t>‹Nr.›</a:t>
             </a:fld>
             <a:endParaRPr lang="en-US"/>
           </a:p>
@@ -2026,7 +2035,7 @@
           <a:p>
             <a:fld id="{11E07752-41DA-40B8-9FE8-052DE1AB6C24}" type="slidenum">
               <a:rPr lang="en-US" smtClean="0"/>
-              <a:t>‹#›</a:t>
+              <a:t>‹Nr.›</a:t>
             </a:fld>
             <a:endParaRPr lang="en-US"/>
           </a:p>
@@ -2139,7 +2148,7 @@
           <a:p>
             <a:fld id="{11E07752-41DA-40B8-9FE8-052DE1AB6C24}" type="slidenum">
               <a:rPr lang="en-US" smtClean="0"/>
-              <a:t>‹#›</a:t>
+              <a:t>‹Nr.›</a:t>
             </a:fld>
             <a:endParaRPr lang="en-US"/>
           </a:p>
@@ -2450,7 +2459,7 @@
           <a:p>
             <a:fld id="{11E07752-41DA-40B8-9FE8-052DE1AB6C24}" type="slidenum">
               <a:rPr lang="en-US" smtClean="0"/>
-              <a:t>‹#›</a:t>
+              <a:t>‹Nr.›</a:t>
             </a:fld>
             <a:endParaRPr lang="en-US"/>
           </a:p>
@@ -2738,7 +2747,7 @@
           <a:p>
             <a:fld id="{11E07752-41DA-40B8-9FE8-052DE1AB6C24}" type="slidenum">
               <a:rPr lang="en-US" smtClean="0"/>
-              <a:t>‹#›</a:t>
+              <a:t>‹Nr.›</a:t>
             </a:fld>
             <a:endParaRPr lang="en-US"/>
           </a:p>
@@ -3015,7 +3024,7 @@
           <a:p>
             <a:fld id="{11E07752-41DA-40B8-9FE8-052DE1AB6C24}" type="slidenum">
               <a:rPr lang="en-US" smtClean="0"/>
-              <a:t>‹#›</a:t>
+              <a:t>‹Nr.›</a:t>
             </a:fld>
             <a:endParaRPr lang="en-US"/>
           </a:p>
@@ -3358,7 +3367,12 @@
             <p:ph type="ctrTitle"/>
           </p:nvPr>
         </p:nvSpPr>
-        <p:spPr/>
+        <p:spPr>
+          <a:xfrm>
+            <a:off x="1524000" y="1041400"/>
+            <a:ext cx="9144000" cy="2387600"/>
+          </a:xfrm>
+        </p:spPr>
         <p:txBody>
           <a:bodyPr/>
           <a:lstStyle/>
@@ -3387,12 +3401,36 @@
             <p:ph type="subTitle" idx="1"/>
           </p:nvPr>
         </p:nvSpPr>
-        <p:spPr/>
-        <p:txBody>
-          <a:bodyPr/>
+        <p:spPr>
+          <a:xfrm>
+            <a:off x="1524000" y="3822172"/>
+            <a:ext cx="9144000" cy="1655762"/>
+          </a:xfrm>
+        </p:spPr>
+        <p:txBody>
+          <a:bodyPr>
+            <a:normAutofit lnSpcReduction="10000"/>
+          </a:bodyPr>
           <a:lstStyle/>
           <a:p>
+            <a:r>
+              <a:rPr lang="en-US" dirty="0"/>
+              <a:t>A deep learning-based tool for stocks prediction</a:t>
+            </a:r>
+          </a:p>
+          <a:p>
             <a:endParaRPr lang="en-US" dirty="0"/>
+          </a:p>
+          <a:p>
+            <a:pPr algn="l"/>
+            <a:endParaRPr lang="en-US" dirty="0"/>
+          </a:p>
+          <a:p>
+            <a:pPr algn="l"/>
+            <a:r>
+              <a:rPr lang="en-US" sz="1800" dirty="0"/>
+              <a:t>Presented by: Ivo Glück, Stephan Fremerey</a:t>
+            </a:r>
           </a:p>
         </p:txBody>
       </p:sp>
@@ -3410,6 +3448,188 @@
 </file>
 
 <file path=ppt/slides/slide10.xml><?xml version="1.0" encoding="utf-8"?>
+<p:sld xmlns:a="http://schemas.openxmlformats.org/drawingml/2006/main" xmlns:r="http://schemas.openxmlformats.org/officeDocument/2006/relationships" xmlns:p="http://schemas.openxmlformats.org/presentationml/2006/main">
+  <p:cSld>
+    <p:spTree>
+      <p:nvGrpSpPr>
+        <p:cNvPr id="1" name="">
+          <a:extLst>
+            <a:ext uri="{FF2B5EF4-FFF2-40B4-BE49-F238E27FC236}">
+              <a16:creationId xmlns:a16="http://schemas.microsoft.com/office/drawing/2014/main" id="{F3DA1B15-20D9-6028-5BAF-669BBDCD880A}"/>
+            </a:ext>
+          </a:extLst>
+        </p:cNvPr>
+        <p:cNvGrpSpPr/>
+        <p:nvPr/>
+      </p:nvGrpSpPr>
+      <p:grpSpPr>
+        <a:xfrm>
+          <a:off x="0" y="0"/>
+          <a:ext cx="0" cy="0"/>
+          <a:chOff x="0" y="0"/>
+          <a:chExt cx="0" cy="0"/>
+        </a:xfrm>
+      </p:grpSpPr>
+      <p:sp>
+        <p:nvSpPr>
+          <p:cNvPr id="2" name="Title 1">
+            <a:extLst>
+              <a:ext uri="{FF2B5EF4-FFF2-40B4-BE49-F238E27FC236}">
+                <a16:creationId xmlns:a16="http://schemas.microsoft.com/office/drawing/2014/main" id="{C6B46AD9-0A4A-10BA-4AC3-B6BDF04B53C7}"/>
+              </a:ext>
+            </a:extLst>
+          </p:cNvPr>
+          <p:cNvSpPr>
+            <a:spLocks noGrp="1"/>
+          </p:cNvSpPr>
+          <p:nvPr>
+            <p:ph type="title"/>
+          </p:nvPr>
+        </p:nvSpPr>
+        <p:spPr/>
+        <p:txBody>
+          <a:bodyPr/>
+          <a:lstStyle/>
+          <a:p>
+            <a:r>
+              <a:rPr lang="de-DE" dirty="0"/>
+              <a:t>Applied </a:t>
+            </a:r>
+            <a:r>
+              <a:rPr lang="de-DE" dirty="0" err="1"/>
+              <a:t>models</a:t>
+            </a:r>
+            <a:r>
+              <a:rPr lang="de-DE" dirty="0"/>
+              <a:t> </a:t>
+            </a:r>
+            <a:endParaRPr lang="en-US" dirty="0"/>
+          </a:p>
+        </p:txBody>
+      </p:sp>
+      <p:sp>
+        <p:nvSpPr>
+          <p:cNvPr id="3" name="Content Placeholder 2">
+            <a:extLst>
+              <a:ext uri="{FF2B5EF4-FFF2-40B4-BE49-F238E27FC236}">
+                <a16:creationId xmlns:a16="http://schemas.microsoft.com/office/drawing/2014/main" id="{F7176549-20BF-5B2D-B668-2F52ABBC509B}"/>
+              </a:ext>
+            </a:extLst>
+          </p:cNvPr>
+          <p:cNvSpPr>
+            <a:spLocks noGrp="1"/>
+          </p:cNvSpPr>
+          <p:nvPr>
+            <p:ph idx="1"/>
+          </p:nvPr>
+        </p:nvSpPr>
+        <p:spPr/>
+        <p:txBody>
+          <a:bodyPr>
+            <a:normAutofit/>
+          </a:bodyPr>
+          <a:lstStyle/>
+          <a:p>
+            <a:r>
+              <a:rPr lang="de-DE" dirty="0"/>
+              <a:t>First </a:t>
+            </a:r>
+            <a:r>
+              <a:rPr lang="de-DE" dirty="0" err="1"/>
+              <a:t>step</a:t>
+            </a:r>
+            <a:r>
+              <a:rPr lang="de-DE" dirty="0"/>
+              <a:t>: </a:t>
+            </a:r>
+            <a:r>
+              <a:rPr lang="de-DE" dirty="0" err="1"/>
+              <a:t>scale</a:t>
+            </a:r>
+            <a:r>
+              <a:rPr lang="de-DE" dirty="0"/>
+              <a:t> </a:t>
+            </a:r>
+            <a:r>
+              <a:rPr lang="de-DE" dirty="0" err="1"/>
+              <a:t>data</a:t>
+            </a:r>
+            <a:r>
+              <a:rPr lang="de-DE" dirty="0"/>
+              <a:t> </a:t>
+            </a:r>
+            <a:r>
+              <a:rPr lang="de-DE" dirty="0" err="1"/>
+              <a:t>using</a:t>
+            </a:r>
+            <a:r>
+              <a:rPr lang="de-DE" dirty="0"/>
+              <a:t> </a:t>
+            </a:r>
+            <a:r>
+              <a:rPr lang="de-DE" dirty="0" err="1"/>
+              <a:t>MinMaxScaler</a:t>
+            </a:r>
+            <a:endParaRPr lang="en-US" dirty="0"/>
+          </a:p>
+          <a:p>
+            <a:r>
+              <a:rPr lang="en-US" dirty="0"/>
+              <a:t>Convolutional Neural Network (CNN)</a:t>
+            </a:r>
+          </a:p>
+          <a:p>
+            <a:pPr marL="0" indent="0">
+              <a:buNone/>
+            </a:pPr>
+            <a:endParaRPr lang="en-US" dirty="0"/>
+          </a:p>
+        </p:txBody>
+      </p:sp>
+      <p:pic>
+        <p:nvPicPr>
+          <p:cNvPr id="5" name="Picture 4">
+            <a:extLst>
+              <a:ext uri="{FF2B5EF4-FFF2-40B4-BE49-F238E27FC236}">
+                <a16:creationId xmlns:a16="http://schemas.microsoft.com/office/drawing/2014/main" id="{B0F9667F-9092-00CA-870E-E0511818930D}"/>
+              </a:ext>
+            </a:extLst>
+          </p:cNvPr>
+          <p:cNvPicPr>
+            <a:picLocks noChangeAspect="1"/>
+          </p:cNvPicPr>
+          <p:nvPr/>
+        </p:nvPicPr>
+        <p:blipFill>
+          <a:blip r:embed="rId2"/>
+          <a:stretch>
+            <a:fillRect/>
+          </a:stretch>
+        </p:blipFill>
+        <p:spPr>
+          <a:xfrm>
+            <a:off x="1150261" y="2898382"/>
+            <a:ext cx="10344150" cy="2600325"/>
+          </a:xfrm>
+          <a:prstGeom prst="rect">
+            <a:avLst/>
+          </a:prstGeom>
+        </p:spPr>
+      </p:pic>
+    </p:spTree>
+    <p:extLst>
+      <p:ext uri="{BB962C8B-B14F-4D97-AF65-F5344CB8AC3E}">
+        <p14:creationId xmlns:p14="http://schemas.microsoft.com/office/powerpoint/2010/main" val="2589736892"/>
+      </p:ext>
+    </p:extLst>
+  </p:cSld>
+  <p:clrMapOvr>
+    <a:masterClrMapping/>
+  </p:clrMapOvr>
+</p:sld>
+</file>
+
+<file path=ppt/slides/slide11.xml><?xml version="1.0" encoding="utf-8"?>
 <p:sld xmlns:a="http://schemas.openxmlformats.org/drawingml/2006/main" xmlns:r="http://schemas.openxmlformats.org/officeDocument/2006/relationships" xmlns:p="http://schemas.openxmlformats.org/presentationml/2006/main">
   <p:cSld>
     <p:spTree>
@@ -3485,7 +3705,12 @@
             <p:ph idx="1"/>
           </p:nvPr>
         </p:nvSpPr>
-        <p:spPr/>
+        <p:spPr>
+          <a:xfrm>
+            <a:off x="838200" y="1825625"/>
+            <a:ext cx="11353800" cy="4351338"/>
+          </a:xfrm>
+        </p:spPr>
         <p:txBody>
           <a:bodyPr>
             <a:normAutofit/>
@@ -3537,7 +3762,7 @@
           <a:p>
             <a:r>
               <a:rPr lang="en-US" dirty="0"/>
-              <a:t>Ensemble Model</a:t>
+              <a:t>Ensemble Model based on RNN, GRU and LSTM (3 top-performing models)</a:t>
             </a:r>
           </a:p>
           <a:p>
@@ -3570,7 +3795,7 @@
         </p:blipFill>
         <p:spPr>
           <a:xfrm>
-            <a:off x="1158324" y="5351432"/>
+            <a:off x="1158324" y="5469964"/>
             <a:ext cx="7400925" cy="981075"/>
           </a:xfrm>
           <a:prstGeom prst="rect">
@@ -3600,7 +3825,7 @@
         </p:blipFill>
         <p:spPr>
           <a:xfrm>
-            <a:off x="1158324" y="2872581"/>
+            <a:off x="1158324" y="2991113"/>
             <a:ext cx="4714875" cy="2257425"/>
           </a:xfrm>
           <a:prstGeom prst="rect">
@@ -3621,7 +3846,7 @@
 </p:sld>
 </file>
 
-<file path=ppt/slides/slide11.xml><?xml version="1.0" encoding="utf-8"?>
+<file path=ppt/slides/slide12.xml><?xml version="1.0" encoding="utf-8"?>
 <p:sld xmlns:a="http://schemas.openxmlformats.org/drawingml/2006/main" xmlns:r="http://schemas.openxmlformats.org/officeDocument/2006/relationships" xmlns:p="http://schemas.openxmlformats.org/presentationml/2006/main">
   <p:cSld>
     <p:spTree>
@@ -3784,7 +4009,7 @@
 </p:sld>
 </file>
 
-<file path=ppt/slides/slide12.xml><?xml version="1.0" encoding="utf-8"?>
+<file path=ppt/slides/slide13.xml><?xml version="1.0" encoding="utf-8"?>
 <p:sld xmlns:a="http://schemas.openxmlformats.org/drawingml/2006/main" xmlns:r="http://schemas.openxmlformats.org/officeDocument/2006/relationships" xmlns:p="http://schemas.openxmlformats.org/presentationml/2006/main">
   <p:cSld>
     <p:spTree>
@@ -3981,7 +4206,7 @@
 </p:sld>
 </file>
 
-<file path=ppt/slides/slide13.xml><?xml version="1.0" encoding="utf-8"?>
+<file path=ppt/slides/slide14.xml><?xml version="1.0" encoding="utf-8"?>
 <p:sld xmlns:a="http://schemas.openxmlformats.org/drawingml/2006/main" xmlns:r="http://schemas.openxmlformats.org/officeDocument/2006/relationships" xmlns:p="http://schemas.openxmlformats.org/presentationml/2006/main">
   <p:cSld>
     <p:spTree>
@@ -4178,7 +4403,7 @@
 </p:sld>
 </file>
 
-<file path=ppt/slides/slide14.xml><?xml version="1.0" encoding="utf-8"?>
+<file path=ppt/slides/slide15.xml><?xml version="1.0" encoding="utf-8"?>
 <p:sld xmlns:a="http://schemas.openxmlformats.org/drawingml/2006/main" xmlns:r="http://schemas.openxmlformats.org/officeDocument/2006/relationships" xmlns:p="http://schemas.openxmlformats.org/presentationml/2006/main">
   <p:cSld>
     <p:spTree>
@@ -4375,7 +4600,7 @@
 </p:sld>
 </file>
 
-<file path=ppt/slides/slide15.xml><?xml version="1.0" encoding="utf-8"?>
+<file path=ppt/slides/slide16.xml><?xml version="1.0" encoding="utf-8"?>
 <p:sld xmlns:a="http://schemas.openxmlformats.org/drawingml/2006/main" xmlns:r="http://schemas.openxmlformats.org/officeDocument/2006/relationships" xmlns:p="http://schemas.openxmlformats.org/presentationml/2006/main">
   <p:cSld>
     <p:spTree>
@@ -4572,7 +4797,7 @@
 </p:sld>
 </file>
 
-<file path=ppt/slides/slide16.xml><?xml version="1.0" encoding="utf-8"?>
+<file path=ppt/slides/slide17.xml><?xml version="1.0" encoding="utf-8"?>
 <p:sld xmlns:a="http://schemas.openxmlformats.org/drawingml/2006/main" xmlns:r="http://schemas.openxmlformats.org/officeDocument/2006/relationships" xmlns:p="http://schemas.openxmlformats.org/presentationml/2006/main">
   <p:cSld>
     <p:spTree>
@@ -4769,7 +4994,7 @@
 </p:sld>
 </file>
 
-<file path=ppt/slides/slide17.xml><?xml version="1.0" encoding="utf-8"?>
+<file path=ppt/slides/slide18.xml><?xml version="1.0" encoding="utf-8"?>
 <p:sld xmlns:a="http://schemas.openxmlformats.org/drawingml/2006/main" xmlns:r="http://schemas.openxmlformats.org/officeDocument/2006/relationships" xmlns:p="http://schemas.openxmlformats.org/presentationml/2006/main">
   <p:cSld>
     <p:spTree>
@@ -5058,7 +5283,7 @@
 </p:sld>
 </file>
 
-<file path=ppt/slides/slide18.xml><?xml version="1.0" encoding="utf-8"?>
+<file path=ppt/slides/slide19.xml><?xml version="1.0" encoding="utf-8"?>
 <p:sld xmlns:a="http://schemas.openxmlformats.org/drawingml/2006/main" xmlns:r="http://schemas.openxmlformats.org/officeDocument/2006/relationships" xmlns:p="http://schemas.openxmlformats.org/presentationml/2006/main">
   <p:cSld>
     <p:spTree>
@@ -5335,7 +5560,744 @@
 </p:sld>
 </file>
 
-<file path=ppt/slides/slide19.xml><?xml version="1.0" encoding="utf-8"?>
+<file path=ppt/slides/slide2.xml><?xml version="1.0" encoding="utf-8"?>
+<p:sld xmlns:a="http://schemas.openxmlformats.org/drawingml/2006/main" xmlns:r="http://schemas.openxmlformats.org/officeDocument/2006/relationships" xmlns:p="http://schemas.openxmlformats.org/presentationml/2006/main">
+  <p:cSld>
+    <p:spTree>
+      <p:nvGrpSpPr>
+        <p:cNvPr id="1" name=""/>
+        <p:cNvGrpSpPr/>
+        <p:nvPr/>
+      </p:nvGrpSpPr>
+      <p:grpSpPr>
+        <a:xfrm>
+          <a:off x="0" y="0"/>
+          <a:ext cx="0" cy="0"/>
+          <a:chOff x="0" y="0"/>
+          <a:chExt cx="0" cy="0"/>
+        </a:xfrm>
+      </p:grpSpPr>
+      <p:sp>
+        <p:nvSpPr>
+          <p:cNvPr id="2" name="Title 1">
+            <a:extLst>
+              <a:ext uri="{FF2B5EF4-FFF2-40B4-BE49-F238E27FC236}">
+                <a16:creationId xmlns:a16="http://schemas.microsoft.com/office/drawing/2014/main" id="{4C902162-C00D-27BA-8035-78C2A4D5EFC2}"/>
+              </a:ext>
+            </a:extLst>
+          </p:cNvPr>
+          <p:cNvSpPr>
+            <a:spLocks noGrp="1"/>
+          </p:cNvSpPr>
+          <p:nvPr>
+            <p:ph type="title"/>
+          </p:nvPr>
+        </p:nvSpPr>
+        <p:spPr/>
+        <p:txBody>
+          <a:bodyPr/>
+          <a:lstStyle/>
+          <a:p>
+            <a:pPr algn="ctr"/>
+            <a:r>
+              <a:rPr lang="de-DE" dirty="0"/>
+              <a:t>General </a:t>
+            </a:r>
+            <a:r>
+              <a:rPr lang="de-DE" dirty="0" err="1"/>
+              <a:t>idea</a:t>
+            </a:r>
+            <a:endParaRPr lang="en-US" dirty="0"/>
+          </a:p>
+        </p:txBody>
+      </p:sp>
+      <p:sp>
+        <p:nvSpPr>
+          <p:cNvPr id="3" name="Content Placeholder 2">
+            <a:extLst>
+              <a:ext uri="{FF2B5EF4-FFF2-40B4-BE49-F238E27FC236}">
+                <a16:creationId xmlns:a16="http://schemas.microsoft.com/office/drawing/2014/main" id="{C5EC69AC-002E-1A92-5753-904AA07C80CD}"/>
+              </a:ext>
+            </a:extLst>
+          </p:cNvPr>
+          <p:cNvSpPr>
+            <a:spLocks noGrp="1"/>
+          </p:cNvSpPr>
+          <p:nvPr>
+            <p:ph idx="1"/>
+          </p:nvPr>
+        </p:nvSpPr>
+        <p:spPr/>
+        <p:txBody>
+          <a:bodyPr>
+            <a:normAutofit fontScale="85000" lnSpcReduction="20000"/>
+          </a:bodyPr>
+          <a:lstStyle/>
+          <a:p>
+            <a:pPr marL="0" indent="0">
+              <a:buNone/>
+            </a:pPr>
+            <a:r>
+              <a:rPr lang="de-DE" dirty="0" err="1"/>
+              <a:t>Build</a:t>
+            </a:r>
+            <a:r>
+              <a:rPr lang="de-DE" dirty="0"/>
+              <a:t> a </a:t>
+            </a:r>
+            <a:r>
+              <a:rPr lang="de-DE" dirty="0" err="1"/>
+              <a:t>deep</a:t>
+            </a:r>
+            <a:r>
+              <a:rPr lang="de-DE" dirty="0"/>
+              <a:t> </a:t>
+            </a:r>
+            <a:r>
+              <a:rPr lang="de-DE" dirty="0" err="1"/>
+              <a:t>learning-based</a:t>
+            </a:r>
+            <a:r>
+              <a:rPr lang="de-DE" dirty="0"/>
+              <a:t> </a:t>
+            </a:r>
+            <a:r>
+              <a:rPr lang="de-DE" dirty="0" err="1"/>
+              <a:t>procedure</a:t>
+            </a:r>
+            <a:r>
+              <a:rPr lang="de-DE" dirty="0"/>
+              <a:t> to </a:t>
+            </a:r>
+            <a:r>
+              <a:rPr lang="de-DE" dirty="0" err="1"/>
+              <a:t>predict</a:t>
+            </a:r>
+            <a:r>
+              <a:rPr lang="de-DE" dirty="0"/>
+              <a:t> </a:t>
+            </a:r>
+            <a:r>
+              <a:rPr lang="de-DE" dirty="0" err="1"/>
+              <a:t>the</a:t>
+            </a:r>
+            <a:r>
+              <a:rPr lang="de-DE" dirty="0"/>
+              <a:t> </a:t>
+            </a:r>
+            <a:r>
+              <a:rPr lang="de-DE" dirty="0" err="1"/>
+              <a:t>close</a:t>
+            </a:r>
+            <a:r>
+              <a:rPr lang="de-DE" dirty="0"/>
+              <a:t> </a:t>
+            </a:r>
+            <a:r>
+              <a:rPr lang="de-DE" dirty="0" err="1"/>
+              <a:t>value</a:t>
+            </a:r>
+            <a:r>
+              <a:rPr lang="de-DE" dirty="0"/>
+              <a:t> </a:t>
+            </a:r>
+            <a:r>
+              <a:rPr lang="de-DE" dirty="0" err="1"/>
+              <a:t>of</a:t>
+            </a:r>
+            <a:r>
+              <a:rPr lang="de-DE" dirty="0"/>
+              <a:t> an </a:t>
+            </a:r>
+            <a:r>
+              <a:rPr lang="de-DE" dirty="0" err="1"/>
+              <a:t>asset</a:t>
+            </a:r>
+            <a:r>
+              <a:rPr lang="de-DE" dirty="0"/>
+              <a:t> </a:t>
+            </a:r>
+            <a:r>
+              <a:rPr lang="de-DE" dirty="0" err="1"/>
+              <a:t>for</a:t>
+            </a:r>
+            <a:r>
+              <a:rPr lang="de-DE" dirty="0"/>
+              <a:t> </a:t>
+            </a:r>
+            <a:r>
+              <a:rPr lang="de-DE" dirty="0" err="1"/>
+              <a:t>the</a:t>
+            </a:r>
+            <a:r>
+              <a:rPr lang="de-DE" dirty="0"/>
+              <a:t> </a:t>
+            </a:r>
+            <a:r>
+              <a:rPr lang="de-DE" dirty="0" err="1"/>
+              <a:t>next</a:t>
+            </a:r>
+            <a:r>
+              <a:rPr lang="de-DE" dirty="0"/>
+              <a:t> </a:t>
+            </a:r>
+            <a:r>
+              <a:rPr lang="de-DE" dirty="0" err="1"/>
+              <a:t>day</a:t>
+            </a:r>
+            <a:r>
+              <a:rPr lang="de-DE" dirty="0"/>
+              <a:t> (</a:t>
+            </a:r>
+            <a:r>
+              <a:rPr lang="de-DE" dirty="0" err="1"/>
+              <a:t>regression</a:t>
+            </a:r>
+            <a:r>
+              <a:rPr lang="de-DE" dirty="0"/>
+              <a:t>). As an </a:t>
+            </a:r>
+            <a:r>
+              <a:rPr lang="de-DE" dirty="0" err="1"/>
+              <a:t>example</a:t>
+            </a:r>
+            <a:r>
+              <a:rPr lang="de-DE" dirty="0"/>
+              <a:t>, </a:t>
+            </a:r>
+            <a:r>
+              <a:rPr lang="de-DE" dirty="0" err="1"/>
+              <a:t>we</a:t>
+            </a:r>
+            <a:r>
+              <a:rPr lang="de-DE" dirty="0"/>
+              <a:t> </a:t>
+            </a:r>
+            <a:r>
+              <a:rPr lang="de-DE" dirty="0" err="1"/>
+              <a:t>took</a:t>
+            </a:r>
+            <a:r>
+              <a:rPr lang="de-DE" dirty="0"/>
+              <a:t> </a:t>
+            </a:r>
+            <a:r>
+              <a:rPr lang="de-DE" dirty="0" err="1"/>
+              <a:t>the</a:t>
+            </a:r>
+            <a:r>
+              <a:rPr lang="de-DE" dirty="0"/>
+              <a:t> META </a:t>
+            </a:r>
+            <a:r>
+              <a:rPr lang="de-DE" dirty="0" err="1"/>
+              <a:t>share</a:t>
+            </a:r>
+            <a:r>
+              <a:rPr lang="de-DE" dirty="0"/>
+              <a:t>.</a:t>
+            </a:r>
+          </a:p>
+          <a:p>
+            <a:pPr marL="0" indent="0">
+              <a:buNone/>
+            </a:pPr>
+            <a:endParaRPr lang="de-DE" dirty="0"/>
+          </a:p>
+          <a:p>
+            <a:pPr marL="0" indent="0">
+              <a:buNone/>
+            </a:pPr>
+            <a:r>
+              <a:rPr lang="de-DE" b="1" dirty="0"/>
+              <a:t>Scenario: </a:t>
+            </a:r>
+          </a:p>
+          <a:p>
+            <a:pPr marL="0" indent="0">
+              <a:buNone/>
+            </a:pPr>
+            <a:r>
+              <a:rPr lang="de-DE" dirty="0" err="1"/>
+              <a:t>Once</a:t>
+            </a:r>
+            <a:r>
+              <a:rPr lang="de-DE" dirty="0"/>
+              <a:t> </a:t>
+            </a:r>
+            <a:r>
+              <a:rPr lang="de-DE" dirty="0" err="1"/>
+              <a:t>the</a:t>
+            </a:r>
+            <a:r>
+              <a:rPr lang="de-DE" dirty="0"/>
+              <a:t> tradefaire </a:t>
+            </a:r>
+            <a:r>
+              <a:rPr lang="de-DE" dirty="0" err="1"/>
+              <a:t>has</a:t>
+            </a:r>
+            <a:r>
+              <a:rPr lang="de-DE" dirty="0"/>
+              <a:t> </a:t>
+            </a:r>
+            <a:r>
+              <a:rPr lang="de-DE" dirty="0" err="1"/>
+              <a:t>closed</a:t>
+            </a:r>
+            <a:r>
+              <a:rPr lang="de-DE" dirty="0"/>
+              <a:t> and </a:t>
+            </a:r>
+            <a:r>
+              <a:rPr lang="de-DE" dirty="0" err="1"/>
+              <a:t>data</a:t>
+            </a:r>
+            <a:r>
+              <a:rPr lang="de-DE" dirty="0"/>
+              <a:t> </a:t>
+            </a:r>
+            <a:r>
+              <a:rPr lang="de-DE" dirty="0" err="1"/>
+              <a:t>are</a:t>
+            </a:r>
+            <a:r>
+              <a:rPr lang="de-DE" dirty="0"/>
+              <a:t> </a:t>
+            </a:r>
+            <a:r>
+              <a:rPr lang="de-DE" dirty="0" err="1"/>
+              <a:t>available</a:t>
+            </a:r>
+            <a:r>
+              <a:rPr lang="de-DE" dirty="0"/>
+              <a:t> (</a:t>
+            </a:r>
+            <a:r>
+              <a:rPr lang="de-DE" dirty="0" err="1"/>
+              <a:t>about</a:t>
+            </a:r>
+            <a:r>
+              <a:rPr lang="de-DE" dirty="0"/>
+              <a:t> 0:00 CET), </a:t>
+            </a:r>
+            <a:r>
+              <a:rPr lang="de-DE" dirty="0" err="1"/>
+              <a:t>train</a:t>
+            </a:r>
+            <a:r>
+              <a:rPr lang="de-DE" dirty="0"/>
+              <a:t> </a:t>
+            </a:r>
+            <a:r>
+              <a:rPr lang="de-DE" dirty="0" err="1"/>
+              <a:t>model</a:t>
+            </a:r>
+            <a:r>
+              <a:rPr lang="de-DE" dirty="0"/>
+              <a:t> </a:t>
+            </a:r>
+            <a:r>
+              <a:rPr lang="de-DE" dirty="0" err="1"/>
+              <a:t>using</a:t>
+            </a:r>
+            <a:r>
+              <a:rPr lang="de-DE" dirty="0"/>
+              <a:t> all </a:t>
+            </a:r>
+            <a:r>
+              <a:rPr lang="de-DE" dirty="0" err="1"/>
+              <a:t>available</a:t>
+            </a:r>
+            <a:r>
+              <a:rPr lang="de-DE" dirty="0"/>
+              <a:t> </a:t>
+            </a:r>
+            <a:r>
+              <a:rPr lang="de-DE" dirty="0" err="1"/>
+              <a:t>data</a:t>
+            </a:r>
+            <a:r>
+              <a:rPr lang="de-DE" dirty="0"/>
+              <a:t> </a:t>
+            </a:r>
+            <a:r>
+              <a:rPr lang="de-DE" dirty="0" err="1"/>
+              <a:t>including</a:t>
+            </a:r>
+            <a:r>
+              <a:rPr lang="de-DE" dirty="0"/>
+              <a:t> </a:t>
+            </a:r>
+            <a:r>
+              <a:rPr lang="de-DE" dirty="0" err="1"/>
+              <a:t>the</a:t>
+            </a:r>
+            <a:r>
+              <a:rPr lang="de-DE" dirty="0"/>
+              <a:t> last </a:t>
+            </a:r>
+            <a:r>
+              <a:rPr lang="de-DE" dirty="0" err="1"/>
+              <a:t>trading</a:t>
+            </a:r>
+            <a:r>
+              <a:rPr lang="de-DE" dirty="0"/>
+              <a:t> </a:t>
+            </a:r>
+            <a:r>
+              <a:rPr lang="de-DE" dirty="0" err="1"/>
+              <a:t>day</a:t>
+            </a:r>
+            <a:r>
+              <a:rPr lang="de-DE" dirty="0"/>
+              <a:t>. </a:t>
+            </a:r>
+          </a:p>
+          <a:p>
+            <a:pPr marL="0" indent="0">
+              <a:buNone/>
+            </a:pPr>
+            <a:r>
+              <a:rPr lang="de-DE" dirty="0"/>
+              <a:t>Act </a:t>
+            </a:r>
+            <a:r>
+              <a:rPr lang="de-DE" dirty="0" err="1"/>
+              <a:t>based</a:t>
+            </a:r>
+            <a:r>
+              <a:rPr lang="de-DE" dirty="0"/>
+              <a:t> on </a:t>
+            </a:r>
+            <a:r>
+              <a:rPr lang="de-DE" dirty="0" err="1"/>
+              <a:t>the</a:t>
+            </a:r>
+            <a:r>
+              <a:rPr lang="de-DE" dirty="0"/>
+              <a:t> </a:t>
+            </a:r>
+            <a:r>
+              <a:rPr lang="de-DE" dirty="0" err="1"/>
+              <a:t>prediction</a:t>
+            </a:r>
+            <a:r>
+              <a:rPr lang="de-DE" dirty="0"/>
+              <a:t> </a:t>
+            </a:r>
+            <a:r>
+              <a:rPr lang="de-DE" dirty="0" err="1"/>
+              <a:t>once</a:t>
+            </a:r>
+            <a:r>
+              <a:rPr lang="de-DE" dirty="0"/>
+              <a:t> </a:t>
+            </a:r>
+            <a:r>
+              <a:rPr lang="de-DE" dirty="0" err="1"/>
+              <a:t>the</a:t>
+            </a:r>
+            <a:r>
+              <a:rPr lang="de-DE" dirty="0"/>
+              <a:t> </a:t>
+            </a:r>
+            <a:r>
+              <a:rPr lang="de-DE" dirty="0" err="1"/>
+              <a:t>tradfaire</a:t>
+            </a:r>
+            <a:r>
+              <a:rPr lang="de-DE" dirty="0"/>
+              <a:t> </a:t>
+            </a:r>
+            <a:r>
+              <a:rPr lang="de-DE" dirty="0" err="1"/>
+              <a:t>has</a:t>
+            </a:r>
+            <a:r>
+              <a:rPr lang="de-DE" dirty="0"/>
+              <a:t> </a:t>
+            </a:r>
+            <a:r>
+              <a:rPr lang="de-DE" dirty="0" err="1"/>
+              <a:t>reopened</a:t>
+            </a:r>
+            <a:r>
+              <a:rPr lang="de-DE" dirty="0"/>
+              <a:t>: </a:t>
+            </a:r>
+          </a:p>
+          <a:p>
+            <a:pPr marL="0" indent="0">
+              <a:buNone/>
+            </a:pPr>
+            <a:r>
+              <a:rPr lang="de-DE" dirty="0" err="1"/>
+              <a:t>if</a:t>
+            </a:r>
+            <a:r>
+              <a:rPr lang="de-DE" dirty="0"/>
+              <a:t> an </a:t>
+            </a:r>
+            <a:r>
+              <a:rPr lang="de-DE" dirty="0" err="1"/>
+              <a:t>increase</a:t>
+            </a:r>
+            <a:r>
+              <a:rPr lang="de-DE" dirty="0"/>
+              <a:t> </a:t>
+            </a:r>
+            <a:r>
+              <a:rPr lang="de-DE" dirty="0" err="1"/>
+              <a:t>is</a:t>
+            </a:r>
+            <a:r>
+              <a:rPr lang="de-DE" dirty="0"/>
+              <a:t> </a:t>
+            </a:r>
+            <a:r>
+              <a:rPr lang="de-DE" dirty="0" err="1"/>
+              <a:t>predicted</a:t>
+            </a:r>
+            <a:r>
+              <a:rPr lang="de-DE" dirty="0"/>
+              <a:t> </a:t>
+            </a:r>
+            <a:r>
+              <a:rPr lang="de-DE" dirty="0" err="1"/>
+              <a:t>buy</a:t>
+            </a:r>
+            <a:r>
+              <a:rPr lang="de-DE" dirty="0"/>
+              <a:t>, </a:t>
+            </a:r>
+            <a:r>
+              <a:rPr lang="de-DE" dirty="0" err="1"/>
+              <a:t>if</a:t>
+            </a:r>
+            <a:r>
+              <a:rPr lang="de-DE" dirty="0"/>
+              <a:t> a </a:t>
+            </a:r>
+            <a:r>
+              <a:rPr lang="de-DE" dirty="0" err="1"/>
+              <a:t>decrease</a:t>
+            </a:r>
+            <a:r>
+              <a:rPr lang="de-DE" dirty="0"/>
+              <a:t> </a:t>
+            </a:r>
+            <a:r>
+              <a:rPr lang="de-DE" dirty="0" err="1"/>
+              <a:t>is</a:t>
+            </a:r>
+            <a:r>
+              <a:rPr lang="de-DE" dirty="0"/>
+              <a:t> </a:t>
+            </a:r>
+            <a:r>
+              <a:rPr lang="de-DE" dirty="0" err="1"/>
+              <a:t>predicted</a:t>
+            </a:r>
+            <a:r>
+              <a:rPr lang="de-DE" dirty="0"/>
+              <a:t> </a:t>
+            </a:r>
+            <a:r>
+              <a:rPr lang="de-DE" dirty="0" err="1"/>
+              <a:t>sell</a:t>
+            </a:r>
+            <a:r>
+              <a:rPr lang="de-DE" dirty="0"/>
+              <a:t> </a:t>
+            </a:r>
+            <a:r>
+              <a:rPr lang="de-DE" dirty="0" err="1"/>
+              <a:t>the</a:t>
+            </a:r>
+            <a:r>
+              <a:rPr lang="de-DE" dirty="0"/>
+              <a:t> </a:t>
+            </a:r>
+            <a:r>
+              <a:rPr lang="de-DE" dirty="0" err="1"/>
+              <a:t>asset</a:t>
+            </a:r>
+            <a:r>
+              <a:rPr lang="de-DE" dirty="0"/>
+              <a:t>.</a:t>
+            </a:r>
+          </a:p>
+          <a:p>
+            <a:pPr marL="0" indent="0">
+              <a:buNone/>
+            </a:pPr>
+            <a:endParaRPr lang="de-DE" dirty="0"/>
+          </a:p>
+          <a:p>
+            <a:pPr marL="0" indent="0">
+              <a:buNone/>
+            </a:pPr>
+            <a:r>
+              <a:rPr lang="de-DE" b="1" dirty="0" err="1"/>
+              <a:t>Prerequisite</a:t>
+            </a:r>
+            <a:r>
+              <a:rPr lang="de-DE" b="1" dirty="0"/>
+              <a:t>: </a:t>
+            </a:r>
+          </a:p>
+          <a:p>
+            <a:pPr marL="0" indent="0">
+              <a:buNone/>
+            </a:pPr>
+            <a:r>
+              <a:rPr lang="de-DE" dirty="0"/>
+              <a:t>At </a:t>
+            </a:r>
+            <a:r>
+              <a:rPr lang="de-DE" dirty="0" err="1"/>
+              <a:t>best</a:t>
+            </a:r>
+            <a:r>
+              <a:rPr lang="de-DE" dirty="0"/>
+              <a:t>, </a:t>
+            </a:r>
+            <a:r>
+              <a:rPr lang="de-DE" dirty="0" err="1"/>
+              <a:t>training</a:t>
+            </a:r>
+            <a:r>
+              <a:rPr lang="de-DE" dirty="0"/>
+              <a:t> </a:t>
+            </a:r>
+            <a:r>
+              <a:rPr lang="de-DE" dirty="0" err="1"/>
+              <a:t>needs</a:t>
+            </a:r>
+            <a:r>
+              <a:rPr lang="de-DE" dirty="0"/>
+              <a:t> to </a:t>
+            </a:r>
+            <a:r>
+              <a:rPr lang="de-DE" dirty="0" err="1"/>
+              <a:t>be</a:t>
+            </a:r>
+            <a:r>
+              <a:rPr lang="de-DE" dirty="0"/>
+              <a:t> </a:t>
+            </a:r>
+            <a:r>
+              <a:rPr lang="de-DE" dirty="0" err="1"/>
+              <a:t>finished</a:t>
+            </a:r>
+            <a:r>
+              <a:rPr lang="de-DE" dirty="0"/>
+              <a:t> </a:t>
+            </a:r>
+            <a:r>
+              <a:rPr lang="de-DE" dirty="0" err="1"/>
+              <a:t>within</a:t>
+            </a:r>
+            <a:r>
+              <a:rPr lang="de-DE" dirty="0"/>
+              <a:t> </a:t>
+            </a:r>
+            <a:r>
+              <a:rPr lang="de-DE" dirty="0" err="1"/>
+              <a:t>the</a:t>
+            </a:r>
+            <a:r>
+              <a:rPr lang="de-DE" dirty="0"/>
+              <a:t> 1 </a:t>
+            </a:r>
+            <a:r>
+              <a:rPr lang="de-DE" dirty="0" err="1"/>
+              <a:t>hour</a:t>
+            </a:r>
+            <a:r>
+              <a:rPr lang="de-DE" dirty="0"/>
+              <a:t> in </a:t>
+            </a:r>
+            <a:r>
+              <a:rPr lang="de-DE" dirty="0" err="1"/>
+              <a:t>which</a:t>
+            </a:r>
+            <a:r>
+              <a:rPr lang="de-DE" dirty="0"/>
+              <a:t> </a:t>
+            </a:r>
+            <a:r>
+              <a:rPr lang="de-DE" dirty="0" err="1"/>
+              <a:t>indices</a:t>
+            </a:r>
+            <a:r>
+              <a:rPr lang="de-DE" dirty="0"/>
+              <a:t> like </a:t>
+            </a:r>
+            <a:r>
+              <a:rPr lang="de-DE" dirty="0" err="1"/>
+              <a:t>the</a:t>
+            </a:r>
+            <a:r>
+              <a:rPr lang="de-DE" dirty="0"/>
+              <a:t> S&amp;P 500 </a:t>
+            </a:r>
+            <a:r>
+              <a:rPr lang="de-DE" dirty="0" err="1"/>
+              <a:t>or</a:t>
+            </a:r>
+            <a:r>
+              <a:rPr lang="de-DE" dirty="0"/>
+              <a:t> </a:t>
+            </a:r>
+            <a:r>
+              <a:rPr lang="de-DE" dirty="0" err="1"/>
+              <a:t>the</a:t>
+            </a:r>
+            <a:r>
+              <a:rPr lang="de-DE" dirty="0"/>
+              <a:t> DJI </a:t>
+            </a:r>
+            <a:r>
+              <a:rPr lang="de-DE" dirty="0" err="1"/>
+              <a:t>are</a:t>
+            </a:r>
+            <a:r>
+              <a:rPr lang="de-DE" dirty="0"/>
+              <a:t> not </a:t>
+            </a:r>
+            <a:r>
+              <a:rPr lang="de-DE" dirty="0" err="1"/>
+              <a:t>tradeable</a:t>
+            </a:r>
+            <a:r>
+              <a:rPr lang="de-DE" dirty="0"/>
+              <a:t>.</a:t>
+            </a:r>
+          </a:p>
+          <a:p>
+            <a:pPr marL="0" indent="0">
+              <a:buNone/>
+            </a:pPr>
+            <a:endParaRPr lang="en-US" dirty="0"/>
+          </a:p>
+        </p:txBody>
+      </p:sp>
+    </p:spTree>
+    <p:extLst>
+      <p:ext uri="{BB962C8B-B14F-4D97-AF65-F5344CB8AC3E}">
+        <p14:creationId xmlns:p14="http://schemas.microsoft.com/office/powerpoint/2010/main" val="1668333977"/>
+      </p:ext>
+    </p:extLst>
+  </p:cSld>
+  <p:clrMapOvr>
+    <a:masterClrMapping/>
+  </p:clrMapOvr>
+</p:sld>
+</file>
+
+<file path=ppt/slides/slide20.xml><?xml version="1.0" encoding="utf-8"?>
 <p:sld xmlns:a="http://schemas.openxmlformats.org/drawingml/2006/main" xmlns:r="http://schemas.openxmlformats.org/officeDocument/2006/relationships" xmlns:p="http://schemas.openxmlformats.org/presentationml/2006/main">
   <p:cSld>
     <p:spTree>
@@ -5612,696 +6574,7 @@
 </p:sld>
 </file>
 
-<file path=ppt/slides/slide2.xml><?xml version="1.0" encoding="utf-8"?>
-<p:sld xmlns:a="http://schemas.openxmlformats.org/drawingml/2006/main" xmlns:r="http://schemas.openxmlformats.org/officeDocument/2006/relationships" xmlns:p="http://schemas.openxmlformats.org/presentationml/2006/main">
-  <p:cSld>
-    <p:spTree>
-      <p:nvGrpSpPr>
-        <p:cNvPr id="1" name=""/>
-        <p:cNvGrpSpPr/>
-        <p:nvPr/>
-      </p:nvGrpSpPr>
-      <p:grpSpPr>
-        <a:xfrm>
-          <a:off x="0" y="0"/>
-          <a:ext cx="0" cy="0"/>
-          <a:chOff x="0" y="0"/>
-          <a:chExt cx="0" cy="0"/>
-        </a:xfrm>
-      </p:grpSpPr>
-      <p:sp>
-        <p:nvSpPr>
-          <p:cNvPr id="2" name="Title 1">
-            <a:extLst>
-              <a:ext uri="{FF2B5EF4-FFF2-40B4-BE49-F238E27FC236}">
-                <a16:creationId xmlns:a16="http://schemas.microsoft.com/office/drawing/2014/main" id="{4C902162-C00D-27BA-8035-78C2A4D5EFC2}"/>
-              </a:ext>
-            </a:extLst>
-          </p:cNvPr>
-          <p:cNvSpPr>
-            <a:spLocks noGrp="1"/>
-          </p:cNvSpPr>
-          <p:nvPr>
-            <p:ph type="title"/>
-          </p:nvPr>
-        </p:nvSpPr>
-        <p:spPr/>
-        <p:txBody>
-          <a:bodyPr/>
-          <a:lstStyle/>
-          <a:p>
-            <a:pPr algn="ctr"/>
-            <a:r>
-              <a:rPr lang="de-DE" dirty="0"/>
-              <a:t>General </a:t>
-            </a:r>
-            <a:r>
-              <a:rPr lang="de-DE" dirty="0" err="1"/>
-              <a:t>idea</a:t>
-            </a:r>
-            <a:endParaRPr lang="en-US" dirty="0"/>
-          </a:p>
-        </p:txBody>
-      </p:sp>
-      <p:sp>
-        <p:nvSpPr>
-          <p:cNvPr id="3" name="Content Placeholder 2">
-            <a:extLst>
-              <a:ext uri="{FF2B5EF4-FFF2-40B4-BE49-F238E27FC236}">
-                <a16:creationId xmlns:a16="http://schemas.microsoft.com/office/drawing/2014/main" id="{C5EC69AC-002E-1A92-5753-904AA07C80CD}"/>
-              </a:ext>
-            </a:extLst>
-          </p:cNvPr>
-          <p:cNvSpPr>
-            <a:spLocks noGrp="1"/>
-          </p:cNvSpPr>
-          <p:nvPr>
-            <p:ph idx="1"/>
-          </p:nvPr>
-        </p:nvSpPr>
-        <p:spPr/>
-        <p:txBody>
-          <a:bodyPr>
-            <a:normAutofit fontScale="85000" lnSpcReduction="20000"/>
-          </a:bodyPr>
-          <a:lstStyle/>
-          <a:p>
-            <a:pPr marL="0" indent="0">
-              <a:buNone/>
-            </a:pPr>
-            <a:r>
-              <a:rPr lang="de-DE" dirty="0" err="1"/>
-              <a:t>Build</a:t>
-            </a:r>
-            <a:r>
-              <a:rPr lang="de-DE" dirty="0"/>
-              <a:t> a </a:t>
-            </a:r>
-            <a:r>
-              <a:rPr lang="de-DE" dirty="0" err="1"/>
-              <a:t>deep</a:t>
-            </a:r>
-            <a:r>
-              <a:rPr lang="de-DE" dirty="0"/>
-              <a:t> </a:t>
-            </a:r>
-            <a:r>
-              <a:rPr lang="de-DE" dirty="0" err="1"/>
-              <a:t>learning-based</a:t>
-            </a:r>
-            <a:r>
-              <a:rPr lang="de-DE" dirty="0"/>
-              <a:t> </a:t>
-            </a:r>
-            <a:r>
-              <a:rPr lang="de-DE" dirty="0" err="1"/>
-              <a:t>procedure</a:t>
-            </a:r>
-            <a:r>
-              <a:rPr lang="de-DE" dirty="0"/>
-              <a:t> to </a:t>
-            </a:r>
-            <a:r>
-              <a:rPr lang="de-DE" dirty="0" err="1"/>
-              <a:t>predict</a:t>
-            </a:r>
-            <a:r>
-              <a:rPr lang="de-DE" dirty="0"/>
-              <a:t> </a:t>
-            </a:r>
-            <a:r>
-              <a:rPr lang="de-DE" dirty="0" err="1"/>
-              <a:t>the</a:t>
-            </a:r>
-            <a:r>
-              <a:rPr lang="de-DE" dirty="0"/>
-              <a:t> </a:t>
-            </a:r>
-            <a:r>
-              <a:rPr lang="de-DE" dirty="0" err="1"/>
-              <a:t>close</a:t>
-            </a:r>
-            <a:r>
-              <a:rPr lang="de-DE" dirty="0"/>
-              <a:t> </a:t>
-            </a:r>
-            <a:r>
-              <a:rPr lang="de-DE" dirty="0" err="1"/>
-              <a:t>value</a:t>
-            </a:r>
-            <a:r>
-              <a:rPr lang="de-DE" dirty="0"/>
-              <a:t> </a:t>
-            </a:r>
-            <a:r>
-              <a:rPr lang="de-DE" dirty="0" err="1"/>
-              <a:t>of</a:t>
-            </a:r>
-            <a:r>
-              <a:rPr lang="de-DE" dirty="0"/>
-              <a:t> an </a:t>
-            </a:r>
-            <a:r>
-              <a:rPr lang="de-DE" dirty="0" err="1"/>
-              <a:t>asset</a:t>
-            </a:r>
-            <a:r>
-              <a:rPr lang="de-DE" dirty="0"/>
-              <a:t> </a:t>
-            </a:r>
-            <a:r>
-              <a:rPr lang="de-DE" dirty="0" err="1"/>
-              <a:t>for</a:t>
-            </a:r>
-            <a:r>
-              <a:rPr lang="de-DE" dirty="0"/>
-              <a:t> </a:t>
-            </a:r>
-            <a:r>
-              <a:rPr lang="de-DE" dirty="0" err="1"/>
-              <a:t>the</a:t>
-            </a:r>
-            <a:r>
-              <a:rPr lang="de-DE" dirty="0"/>
-              <a:t> </a:t>
-            </a:r>
-            <a:r>
-              <a:rPr lang="de-DE" dirty="0" err="1"/>
-              <a:t>next</a:t>
-            </a:r>
-            <a:r>
-              <a:rPr lang="de-DE" dirty="0"/>
-              <a:t> </a:t>
-            </a:r>
-            <a:r>
-              <a:rPr lang="de-DE" dirty="0" err="1"/>
-              <a:t>day</a:t>
-            </a:r>
-            <a:r>
-              <a:rPr lang="de-DE" dirty="0"/>
-              <a:t> (</a:t>
-            </a:r>
-            <a:r>
-              <a:rPr lang="de-DE" dirty="0" err="1"/>
-              <a:t>regression</a:t>
-            </a:r>
-            <a:r>
-              <a:rPr lang="de-DE" dirty="0"/>
-              <a:t>). As an </a:t>
-            </a:r>
-            <a:r>
-              <a:rPr lang="de-DE" dirty="0" err="1"/>
-              <a:t>example</a:t>
-            </a:r>
-            <a:r>
-              <a:rPr lang="de-DE" dirty="0"/>
-              <a:t> </a:t>
-            </a:r>
-            <a:r>
-              <a:rPr lang="de-DE" dirty="0" err="1"/>
-              <a:t>we</a:t>
-            </a:r>
-            <a:r>
-              <a:rPr lang="de-DE" dirty="0"/>
-              <a:t> </a:t>
-            </a:r>
-            <a:r>
-              <a:rPr lang="de-DE" dirty="0" err="1"/>
-              <a:t>took</a:t>
-            </a:r>
-            <a:r>
-              <a:rPr lang="de-DE" dirty="0"/>
-              <a:t> </a:t>
-            </a:r>
-            <a:r>
-              <a:rPr lang="de-DE" dirty="0" err="1"/>
-              <a:t>the</a:t>
-            </a:r>
-            <a:r>
-              <a:rPr lang="de-DE" dirty="0"/>
-              <a:t> META </a:t>
-            </a:r>
-            <a:r>
-              <a:rPr lang="de-DE" dirty="0" err="1"/>
-              <a:t>share</a:t>
-            </a:r>
-            <a:r>
-              <a:rPr lang="de-DE" dirty="0"/>
-              <a:t>.</a:t>
-            </a:r>
-          </a:p>
-          <a:p>
-            <a:pPr marL="0" indent="0">
-              <a:buNone/>
-            </a:pPr>
-            <a:endParaRPr lang="de-DE" dirty="0"/>
-          </a:p>
-          <a:p>
-            <a:pPr marL="0" indent="0">
-              <a:buNone/>
-            </a:pPr>
-            <a:r>
-              <a:rPr lang="de-DE" dirty="0"/>
-              <a:t>Scenario: </a:t>
-            </a:r>
-          </a:p>
-          <a:p>
-            <a:pPr marL="0" indent="0">
-              <a:buNone/>
-            </a:pPr>
-            <a:r>
-              <a:rPr lang="de-DE" dirty="0" err="1"/>
-              <a:t>Once</a:t>
-            </a:r>
-            <a:r>
-              <a:rPr lang="de-DE" dirty="0"/>
-              <a:t> </a:t>
-            </a:r>
-            <a:r>
-              <a:rPr lang="de-DE" dirty="0" err="1"/>
-              <a:t>the</a:t>
-            </a:r>
-            <a:r>
-              <a:rPr lang="de-DE" dirty="0"/>
-              <a:t> tradefaire </a:t>
-            </a:r>
-            <a:r>
-              <a:rPr lang="de-DE" dirty="0" err="1"/>
-              <a:t>has</a:t>
-            </a:r>
-            <a:r>
-              <a:rPr lang="de-DE" dirty="0"/>
-              <a:t> </a:t>
-            </a:r>
-            <a:r>
-              <a:rPr lang="de-DE" dirty="0" err="1"/>
-              <a:t>closed</a:t>
-            </a:r>
-            <a:r>
-              <a:rPr lang="de-DE" dirty="0"/>
-              <a:t> </a:t>
-            </a:r>
-            <a:r>
-              <a:rPr lang="de-DE" dirty="0" err="1"/>
-              <a:t>train</a:t>
-            </a:r>
-            <a:r>
-              <a:rPr lang="de-DE" dirty="0"/>
-              <a:t> </a:t>
-            </a:r>
-            <a:r>
-              <a:rPr lang="de-DE" dirty="0" err="1"/>
-              <a:t>model</a:t>
-            </a:r>
-            <a:r>
-              <a:rPr lang="de-DE" dirty="0"/>
-              <a:t> </a:t>
-            </a:r>
-            <a:r>
-              <a:rPr lang="de-DE" dirty="0" err="1"/>
-              <a:t>using</a:t>
-            </a:r>
-            <a:r>
-              <a:rPr lang="de-DE" dirty="0"/>
-              <a:t> all </a:t>
-            </a:r>
-            <a:r>
-              <a:rPr lang="de-DE" dirty="0" err="1"/>
-              <a:t>available</a:t>
-            </a:r>
-            <a:r>
-              <a:rPr lang="de-DE" dirty="0"/>
-              <a:t> </a:t>
-            </a:r>
-            <a:r>
-              <a:rPr lang="de-DE" dirty="0" err="1"/>
-              <a:t>data</a:t>
-            </a:r>
-            <a:r>
-              <a:rPr lang="de-DE" dirty="0"/>
-              <a:t> </a:t>
-            </a:r>
-            <a:r>
-              <a:rPr lang="de-DE" dirty="0" err="1"/>
-              <a:t>including</a:t>
-            </a:r>
-            <a:r>
-              <a:rPr lang="de-DE" dirty="0"/>
-              <a:t> </a:t>
-            </a:r>
-            <a:r>
-              <a:rPr lang="de-DE" dirty="0" err="1"/>
-              <a:t>the</a:t>
-            </a:r>
-            <a:r>
-              <a:rPr lang="de-DE" dirty="0"/>
-              <a:t> last </a:t>
-            </a:r>
-            <a:r>
-              <a:rPr lang="de-DE" dirty="0" err="1"/>
-              <a:t>trading</a:t>
-            </a:r>
-            <a:r>
-              <a:rPr lang="de-DE" dirty="0"/>
-              <a:t> </a:t>
-            </a:r>
-            <a:r>
-              <a:rPr lang="de-DE" dirty="0" err="1"/>
-              <a:t>day</a:t>
-            </a:r>
-            <a:r>
-              <a:rPr lang="de-DE" dirty="0"/>
-              <a:t>. </a:t>
-            </a:r>
-          </a:p>
-          <a:p>
-            <a:pPr marL="0" indent="0">
-              <a:buNone/>
-            </a:pPr>
-            <a:r>
-              <a:rPr lang="de-DE" dirty="0"/>
-              <a:t>Act </a:t>
-            </a:r>
-            <a:r>
-              <a:rPr lang="de-DE" dirty="0" err="1"/>
-              <a:t>based</a:t>
-            </a:r>
-            <a:r>
-              <a:rPr lang="de-DE" dirty="0"/>
-              <a:t> on </a:t>
-            </a:r>
-            <a:r>
-              <a:rPr lang="de-DE" dirty="0" err="1"/>
-              <a:t>the</a:t>
-            </a:r>
-            <a:r>
-              <a:rPr lang="de-DE" dirty="0"/>
-              <a:t> </a:t>
-            </a:r>
-            <a:r>
-              <a:rPr lang="de-DE" dirty="0" err="1"/>
-              <a:t>prediction</a:t>
-            </a:r>
-            <a:r>
-              <a:rPr lang="de-DE" dirty="0"/>
-              <a:t> </a:t>
-            </a:r>
-            <a:r>
-              <a:rPr lang="de-DE" dirty="0" err="1"/>
-              <a:t>once</a:t>
-            </a:r>
-            <a:r>
-              <a:rPr lang="de-DE" dirty="0"/>
-              <a:t> </a:t>
-            </a:r>
-            <a:r>
-              <a:rPr lang="de-DE" dirty="0" err="1"/>
-              <a:t>the</a:t>
-            </a:r>
-            <a:r>
-              <a:rPr lang="de-DE" dirty="0"/>
-              <a:t> </a:t>
-            </a:r>
-            <a:r>
-              <a:rPr lang="de-DE" dirty="0" err="1"/>
-              <a:t>tradfaire</a:t>
-            </a:r>
-            <a:r>
-              <a:rPr lang="de-DE" dirty="0"/>
-              <a:t> </a:t>
-            </a:r>
-            <a:r>
-              <a:rPr lang="de-DE" dirty="0" err="1"/>
-              <a:t>has</a:t>
-            </a:r>
-            <a:r>
-              <a:rPr lang="de-DE" dirty="0"/>
-              <a:t> </a:t>
-            </a:r>
-            <a:r>
-              <a:rPr lang="de-DE" dirty="0" err="1"/>
-              <a:t>reopened</a:t>
-            </a:r>
-            <a:r>
-              <a:rPr lang="de-DE" dirty="0"/>
-              <a:t>: </a:t>
-            </a:r>
-          </a:p>
-          <a:p>
-            <a:pPr marL="0" indent="0">
-              <a:buNone/>
-            </a:pPr>
-            <a:r>
-              <a:rPr lang="de-DE" dirty="0" err="1"/>
-              <a:t>if</a:t>
-            </a:r>
-            <a:r>
-              <a:rPr lang="de-DE" dirty="0"/>
-              <a:t> an </a:t>
-            </a:r>
-            <a:r>
-              <a:rPr lang="de-DE" dirty="0" err="1"/>
-              <a:t>increase</a:t>
-            </a:r>
-            <a:r>
-              <a:rPr lang="de-DE" dirty="0"/>
-              <a:t> </a:t>
-            </a:r>
-            <a:r>
-              <a:rPr lang="de-DE" dirty="0" err="1"/>
-              <a:t>is</a:t>
-            </a:r>
-            <a:r>
-              <a:rPr lang="de-DE" dirty="0"/>
-              <a:t> </a:t>
-            </a:r>
-            <a:r>
-              <a:rPr lang="de-DE" dirty="0" err="1"/>
-              <a:t>predicted</a:t>
-            </a:r>
-            <a:r>
-              <a:rPr lang="de-DE" dirty="0"/>
-              <a:t> </a:t>
-            </a:r>
-            <a:r>
-              <a:rPr lang="de-DE" dirty="0" err="1"/>
-              <a:t>buy</a:t>
-            </a:r>
-            <a:r>
-              <a:rPr lang="de-DE" dirty="0"/>
-              <a:t>, </a:t>
-            </a:r>
-            <a:r>
-              <a:rPr lang="de-DE" dirty="0" err="1"/>
-              <a:t>if</a:t>
-            </a:r>
-            <a:r>
-              <a:rPr lang="de-DE" dirty="0"/>
-              <a:t> a </a:t>
-            </a:r>
-            <a:r>
-              <a:rPr lang="de-DE" dirty="0" err="1"/>
-              <a:t>decrease</a:t>
-            </a:r>
-            <a:r>
-              <a:rPr lang="de-DE" dirty="0"/>
-              <a:t> </a:t>
-            </a:r>
-            <a:r>
-              <a:rPr lang="de-DE" dirty="0" err="1"/>
-              <a:t>is</a:t>
-            </a:r>
-            <a:r>
-              <a:rPr lang="de-DE" dirty="0"/>
-              <a:t> </a:t>
-            </a:r>
-            <a:r>
-              <a:rPr lang="de-DE" dirty="0" err="1"/>
-              <a:t>predicted</a:t>
-            </a:r>
-            <a:r>
-              <a:rPr lang="de-DE" dirty="0"/>
-              <a:t> </a:t>
-            </a:r>
-            <a:r>
-              <a:rPr lang="de-DE" dirty="0" err="1"/>
-              <a:t>sell</a:t>
-            </a:r>
-            <a:r>
-              <a:rPr lang="de-DE" dirty="0"/>
-              <a:t> </a:t>
-            </a:r>
-            <a:r>
-              <a:rPr lang="de-DE" dirty="0" err="1"/>
-              <a:t>the</a:t>
-            </a:r>
-            <a:r>
-              <a:rPr lang="de-DE" dirty="0"/>
-              <a:t> </a:t>
-            </a:r>
-            <a:r>
-              <a:rPr lang="de-DE" dirty="0" err="1"/>
-              <a:t>asset</a:t>
-            </a:r>
-            <a:r>
-              <a:rPr lang="de-DE" dirty="0"/>
-              <a:t>.  </a:t>
-            </a:r>
-          </a:p>
-          <a:p>
-            <a:pPr marL="0" indent="0">
-              <a:buNone/>
-            </a:pPr>
-            <a:endParaRPr lang="de-DE" dirty="0"/>
-          </a:p>
-          <a:p>
-            <a:pPr marL="0" indent="0">
-              <a:buNone/>
-            </a:pPr>
-            <a:r>
-              <a:rPr lang="de-DE" dirty="0" err="1"/>
-              <a:t>Prerequisite</a:t>
-            </a:r>
-            <a:r>
-              <a:rPr lang="de-DE" dirty="0"/>
-              <a:t>: </a:t>
-            </a:r>
-          </a:p>
-          <a:p>
-            <a:pPr marL="0" indent="0">
-              <a:buNone/>
-            </a:pPr>
-            <a:r>
-              <a:rPr lang="de-DE" dirty="0"/>
-              <a:t>Training </a:t>
-            </a:r>
-            <a:r>
-              <a:rPr lang="de-DE" dirty="0" err="1"/>
-              <a:t>of</a:t>
-            </a:r>
-            <a:r>
-              <a:rPr lang="de-DE" dirty="0"/>
-              <a:t> </a:t>
-            </a:r>
-            <a:r>
-              <a:rPr lang="de-DE" dirty="0" err="1"/>
-              <a:t>the</a:t>
-            </a:r>
-            <a:r>
-              <a:rPr lang="de-DE" dirty="0"/>
-              <a:t> </a:t>
-            </a:r>
-            <a:r>
-              <a:rPr lang="de-DE" dirty="0" err="1"/>
-              <a:t>procedure</a:t>
-            </a:r>
-            <a:r>
-              <a:rPr lang="de-DE" dirty="0"/>
-              <a:t> </a:t>
-            </a:r>
-            <a:r>
-              <a:rPr lang="de-DE" dirty="0" err="1"/>
-              <a:t>needs</a:t>
-            </a:r>
-            <a:r>
-              <a:rPr lang="de-DE" dirty="0"/>
-              <a:t> to </a:t>
-            </a:r>
-            <a:r>
-              <a:rPr lang="de-DE" dirty="0" err="1"/>
-              <a:t>be</a:t>
-            </a:r>
-            <a:r>
-              <a:rPr lang="de-DE" dirty="0"/>
-              <a:t> </a:t>
-            </a:r>
-            <a:r>
-              <a:rPr lang="de-DE" dirty="0" err="1"/>
-              <a:t>finished</a:t>
-            </a:r>
-            <a:r>
-              <a:rPr lang="de-DE" dirty="0"/>
-              <a:t> </a:t>
-            </a:r>
-            <a:r>
-              <a:rPr lang="de-DE" dirty="0" err="1"/>
-              <a:t>within</a:t>
-            </a:r>
-            <a:r>
-              <a:rPr lang="de-DE" dirty="0"/>
-              <a:t> </a:t>
-            </a:r>
-            <a:r>
-              <a:rPr lang="de-DE" dirty="0" err="1"/>
-              <a:t>the</a:t>
-            </a:r>
-            <a:r>
-              <a:rPr lang="de-DE" dirty="0"/>
-              <a:t> 1 </a:t>
-            </a:r>
-            <a:r>
-              <a:rPr lang="de-DE" dirty="0" err="1"/>
-              <a:t>hour</a:t>
-            </a:r>
-            <a:r>
-              <a:rPr lang="de-DE" dirty="0"/>
-              <a:t> in </a:t>
-            </a:r>
-            <a:r>
-              <a:rPr lang="de-DE" dirty="0" err="1"/>
-              <a:t>which</a:t>
-            </a:r>
-            <a:r>
-              <a:rPr lang="de-DE" dirty="0"/>
-              <a:t> </a:t>
-            </a:r>
-            <a:r>
-              <a:rPr lang="de-DE" dirty="0" err="1"/>
-              <a:t>the</a:t>
-            </a:r>
-            <a:r>
-              <a:rPr lang="de-DE" dirty="0"/>
-              <a:t> US tradefaire </a:t>
-            </a:r>
-            <a:r>
-              <a:rPr lang="de-DE" dirty="0" err="1"/>
-              <a:t>is</a:t>
-            </a:r>
-            <a:r>
-              <a:rPr lang="de-DE" dirty="0"/>
-              <a:t> </a:t>
-            </a:r>
-            <a:r>
-              <a:rPr lang="de-DE" dirty="0" err="1"/>
-              <a:t>closed</a:t>
-            </a:r>
-            <a:r>
-              <a:rPr lang="de-DE" dirty="0"/>
-              <a:t>.</a:t>
-            </a:r>
-          </a:p>
-          <a:p>
-            <a:pPr marL="0" indent="0">
-              <a:buNone/>
-            </a:pPr>
-            <a:endParaRPr lang="en-US" dirty="0"/>
-          </a:p>
-        </p:txBody>
-      </p:sp>
-    </p:spTree>
-    <p:extLst>
-      <p:ext uri="{BB962C8B-B14F-4D97-AF65-F5344CB8AC3E}">
-        <p14:creationId xmlns:p14="http://schemas.microsoft.com/office/powerpoint/2010/main" val="1668333977"/>
-      </p:ext>
-    </p:extLst>
-  </p:cSld>
-  <p:clrMapOvr>
-    <a:masterClrMapping/>
-  </p:clrMapOvr>
-</p:sld>
-</file>
-
-<file path=ppt/slides/slide20.xml><?xml version="1.0" encoding="utf-8"?>
+<file path=ppt/slides/slide21.xml><?xml version="1.0" encoding="utf-8"?>
 <p:sld xmlns:a="http://schemas.openxmlformats.org/drawingml/2006/main" xmlns:r="http://schemas.openxmlformats.org/officeDocument/2006/relationships" xmlns:p="http://schemas.openxmlformats.org/presentationml/2006/main">
   <p:cSld>
     <p:spTree>
@@ -6584,7 +6857,7 @@
 </p:sld>
 </file>
 
-<file path=ppt/slides/slide21.xml><?xml version="1.0" encoding="utf-8"?>
+<file path=ppt/slides/slide22.xml><?xml version="1.0" encoding="utf-8"?>
 <p:sld xmlns:a="http://schemas.openxmlformats.org/drawingml/2006/main" xmlns:r="http://schemas.openxmlformats.org/officeDocument/2006/relationships" xmlns:p="http://schemas.openxmlformats.org/presentationml/2006/main">
   <p:cSld>
     <p:spTree>
@@ -6867,7 +7140,7 @@
 </p:sld>
 </file>
 
-<file path=ppt/slides/slide22.xml><?xml version="1.0" encoding="utf-8"?>
+<file path=ppt/slides/slide23.xml><?xml version="1.0" encoding="utf-8"?>
 <p:sld xmlns:a="http://schemas.openxmlformats.org/drawingml/2006/main" xmlns:r="http://schemas.openxmlformats.org/officeDocument/2006/relationships" xmlns:p="http://schemas.openxmlformats.org/presentationml/2006/main">
   <p:cSld>
     <p:spTree>
@@ -7015,6 +7288,593 @@
     <p:extLst>
       <p:ext uri="{BB962C8B-B14F-4D97-AF65-F5344CB8AC3E}">
         <p14:creationId xmlns:p14="http://schemas.microsoft.com/office/powerpoint/2010/main" val="4000332666"/>
+      </p:ext>
+    </p:extLst>
+  </p:cSld>
+  <p:clrMapOvr>
+    <a:masterClrMapping/>
+  </p:clrMapOvr>
+</p:sld>
+</file>
+
+<file path=ppt/slides/slide24.xml><?xml version="1.0" encoding="utf-8"?>
+<p:sld xmlns:a="http://schemas.openxmlformats.org/drawingml/2006/main" xmlns:r="http://schemas.openxmlformats.org/officeDocument/2006/relationships" xmlns:p="http://schemas.openxmlformats.org/presentationml/2006/main">
+  <p:cSld>
+    <p:spTree>
+      <p:nvGrpSpPr>
+        <p:cNvPr id="1" name="">
+          <a:extLst>
+            <a:ext uri="{FF2B5EF4-FFF2-40B4-BE49-F238E27FC236}">
+              <a16:creationId xmlns:a16="http://schemas.microsoft.com/office/drawing/2014/main" id="{B0CD61B3-8641-2748-6FAD-666EB545C2A0}"/>
+            </a:ext>
+          </a:extLst>
+        </p:cNvPr>
+        <p:cNvGrpSpPr/>
+        <p:nvPr/>
+      </p:nvGrpSpPr>
+      <p:grpSpPr>
+        <a:xfrm>
+          <a:off x="0" y="0"/>
+          <a:ext cx="0" cy="0"/>
+          <a:chOff x="0" y="0"/>
+          <a:chExt cx="0" cy="0"/>
+        </a:xfrm>
+      </p:grpSpPr>
+      <p:sp>
+        <p:nvSpPr>
+          <p:cNvPr id="4" name="Title 1">
+            <a:extLst>
+              <a:ext uri="{FF2B5EF4-FFF2-40B4-BE49-F238E27FC236}">
+                <a16:creationId xmlns:a16="http://schemas.microsoft.com/office/drawing/2014/main" id="{A29C6FE6-5EEE-593F-BD8D-757F05289984}"/>
+              </a:ext>
+            </a:extLst>
+          </p:cNvPr>
+          <p:cNvSpPr>
+            <a:spLocks noGrp="1"/>
+          </p:cNvSpPr>
+          <p:nvPr>
+            <p:ph type="title"/>
+          </p:nvPr>
+        </p:nvSpPr>
+        <p:spPr>
+          <a:xfrm>
+            <a:off x="838200" y="102834"/>
+            <a:ext cx="10515600" cy="585489"/>
+          </a:xfrm>
+        </p:spPr>
+        <p:txBody>
+          <a:bodyPr>
+            <a:normAutofit fontScale="90000"/>
+          </a:bodyPr>
+          <a:lstStyle/>
+          <a:p>
+            <a:pPr algn="ctr"/>
+            <a:r>
+              <a:rPr lang="de-DE" sz="2000" b="1" dirty="0"/>
+              <a:t>Table </a:t>
+            </a:r>
+            <a:r>
+              <a:rPr lang="de-DE" sz="2000" b="1" dirty="0" err="1"/>
+              <a:t>from</a:t>
+            </a:r>
+            <a:r>
+              <a:rPr lang="de-DE" sz="2000" b="1" dirty="0"/>
+              <a:t> </a:t>
+            </a:r>
+            <a:r>
+              <a:rPr lang="de-DE" sz="2000" b="1" dirty="0" err="1"/>
+              <a:t>data</a:t>
+            </a:r>
+            <a:r>
+              <a:rPr lang="de-DE" sz="2000" b="1" dirty="0"/>
+              <a:t> in plots_5years/results.txt </a:t>
+            </a:r>
+            <a:r>
+              <a:rPr lang="de-DE" sz="2000" b="1" dirty="0" err="1"/>
+              <a:t>comes</a:t>
+            </a:r>
+            <a:r>
+              <a:rPr lang="de-DE" sz="2000" b="1" dirty="0"/>
+              <a:t> </a:t>
+            </a:r>
+            <a:r>
+              <a:rPr lang="de-DE" sz="2000" b="1" dirty="0" err="1"/>
+              <a:t>here</a:t>
+            </a:r>
+            <a:br>
+              <a:rPr lang="de-DE" sz="2000" b="1" dirty="0"/>
+            </a:br>
+            <a:r>
+              <a:rPr lang="de-DE" sz="2000" b="1" dirty="0" err="1"/>
+              <a:t>to</a:t>
+            </a:r>
+            <a:r>
+              <a:rPr lang="de-DE" sz="2000" b="1" dirty="0"/>
+              <a:t> </a:t>
+            </a:r>
+            <a:r>
+              <a:rPr lang="de-DE" sz="2000" b="1" dirty="0" err="1"/>
+              <a:t>compare</a:t>
+            </a:r>
+            <a:r>
+              <a:rPr lang="de-DE" sz="2000" b="1" dirty="0"/>
+              <a:t> </a:t>
+            </a:r>
+            <a:r>
+              <a:rPr lang="de-DE" sz="2000" b="1" dirty="0" err="1"/>
+              <a:t>prediction</a:t>
+            </a:r>
+            <a:r>
+              <a:rPr lang="de-DE" sz="2000" b="1" dirty="0"/>
+              <a:t> </a:t>
+            </a:r>
+            <a:r>
+              <a:rPr lang="de-DE" sz="2000" b="1" dirty="0" err="1"/>
+              <a:t>with</a:t>
+            </a:r>
+            <a:r>
+              <a:rPr lang="de-DE" sz="2000" b="1" dirty="0"/>
+              <a:t> real-</a:t>
+            </a:r>
+            <a:r>
+              <a:rPr lang="de-DE" sz="2000" b="1" dirty="0" err="1"/>
+              <a:t>world</a:t>
+            </a:r>
+            <a:r>
+              <a:rPr lang="de-DE" sz="2000" b="1" dirty="0"/>
+              <a:t> </a:t>
+            </a:r>
+            <a:r>
+              <a:rPr lang="de-DE" sz="2000" b="1" dirty="0" err="1"/>
+              <a:t>data</a:t>
+            </a:r>
+            <a:r>
+              <a:rPr lang="de-DE" sz="2000" b="1" dirty="0"/>
+              <a:t> </a:t>
+            </a:r>
+            <a:r>
+              <a:rPr lang="de-DE" sz="2000" b="1" dirty="0" err="1"/>
+              <a:t>from</a:t>
+            </a:r>
+            <a:r>
+              <a:rPr lang="de-DE" sz="2000" b="1" dirty="0"/>
+              <a:t> </a:t>
+            </a:r>
+            <a:r>
+              <a:rPr lang="de-DE" sz="2000" b="1" dirty="0" err="1"/>
+              <a:t>the</a:t>
+            </a:r>
+            <a:r>
+              <a:rPr lang="de-DE" sz="2000" b="1" dirty="0"/>
+              <a:t> real </a:t>
+            </a:r>
+            <a:r>
+              <a:rPr lang="de-DE" sz="2000" b="1" dirty="0" err="1"/>
+              <a:t>closes</a:t>
+            </a:r>
+            <a:endParaRPr lang="en-US" sz="2000" b="1" dirty="0"/>
+          </a:p>
+        </p:txBody>
+      </p:sp>
+      <p:sp>
+        <p:nvSpPr>
+          <p:cNvPr id="5" name="Title 1">
+            <a:extLst>
+              <a:ext uri="{FF2B5EF4-FFF2-40B4-BE49-F238E27FC236}">
+                <a16:creationId xmlns:a16="http://schemas.microsoft.com/office/drawing/2014/main" id="{D71ABB0C-19C5-C054-F506-4FFC45F262E5}"/>
+              </a:ext>
+            </a:extLst>
+          </p:cNvPr>
+          <p:cNvSpPr txBox="1">
+            <a:spLocks/>
+          </p:cNvSpPr>
+          <p:nvPr/>
+        </p:nvSpPr>
+        <p:spPr>
+          <a:xfrm>
+            <a:off x="838200" y="318359"/>
+            <a:ext cx="10515600" cy="585489"/>
+          </a:xfrm>
+          <a:prstGeom prst="rect">
+            <a:avLst/>
+          </a:prstGeom>
+        </p:spPr>
+        <p:txBody>
+          <a:bodyPr vert="horz" lIns="91440" tIns="45720" rIns="91440" bIns="45720" rtlCol="0" anchor="ctr">
+            <a:normAutofit/>
+          </a:bodyPr>
+          <a:lstStyle>
+            <a:lvl1pPr algn="l" defTabSz="914400" rtl="0" eaLnBrk="1" latinLnBrk="0" hangingPunct="1">
+              <a:lnSpc>
+                <a:spcPct val="90000"/>
+              </a:lnSpc>
+              <a:spcBef>
+                <a:spcPct val="0"/>
+              </a:spcBef>
+              <a:buNone/>
+              <a:defRPr sz="4400" kern="1200">
+                <a:solidFill>
+                  <a:schemeClr val="tx1"/>
+                </a:solidFill>
+                <a:latin typeface="+mj-lt"/>
+                <a:ea typeface="+mj-ea"/>
+                <a:cs typeface="+mj-cs"/>
+              </a:defRPr>
+            </a:lvl1pPr>
+          </a:lstStyle>
+          <a:p>
+            <a:pPr algn="ctr"/>
+            <a:endParaRPr lang="en-US" sz="2000" b="1" dirty="0"/>
+          </a:p>
+        </p:txBody>
+      </p:sp>
+    </p:spTree>
+    <p:extLst>
+      <p:ext uri="{BB962C8B-B14F-4D97-AF65-F5344CB8AC3E}">
+        <p14:creationId xmlns:p14="http://schemas.microsoft.com/office/powerpoint/2010/main" val="185403250"/>
+      </p:ext>
+    </p:extLst>
+  </p:cSld>
+  <p:clrMapOvr>
+    <a:masterClrMapping/>
+  </p:clrMapOvr>
+</p:sld>
+</file>
+
+<file path=ppt/slides/slide25.xml><?xml version="1.0" encoding="utf-8"?>
+<p:sld xmlns:a="http://schemas.openxmlformats.org/drawingml/2006/main" xmlns:r="http://schemas.openxmlformats.org/officeDocument/2006/relationships" xmlns:p="http://schemas.openxmlformats.org/presentationml/2006/main">
+  <p:cSld>
+    <p:spTree>
+      <p:nvGrpSpPr>
+        <p:cNvPr id="1" name="">
+          <a:extLst>
+            <a:ext uri="{FF2B5EF4-FFF2-40B4-BE49-F238E27FC236}">
+              <a16:creationId xmlns:a16="http://schemas.microsoft.com/office/drawing/2014/main" id="{FD486627-FBB5-673F-EFDF-67DBF5D3D1BD}"/>
+            </a:ext>
+          </a:extLst>
+        </p:cNvPr>
+        <p:cNvGrpSpPr/>
+        <p:nvPr/>
+      </p:nvGrpSpPr>
+      <p:grpSpPr>
+        <a:xfrm>
+          <a:off x="0" y="0"/>
+          <a:ext cx="0" cy="0"/>
+          <a:chOff x="0" y="0"/>
+          <a:chExt cx="0" cy="0"/>
+        </a:xfrm>
+      </p:grpSpPr>
+      <p:sp>
+        <p:nvSpPr>
+          <p:cNvPr id="2" name="Title 1">
+            <a:extLst>
+              <a:ext uri="{FF2B5EF4-FFF2-40B4-BE49-F238E27FC236}">
+                <a16:creationId xmlns:a16="http://schemas.microsoft.com/office/drawing/2014/main" id="{A0483AFE-E1AF-1412-E42A-054E308235E9}"/>
+              </a:ext>
+            </a:extLst>
+          </p:cNvPr>
+          <p:cNvSpPr>
+            <a:spLocks noGrp="1"/>
+          </p:cNvSpPr>
+          <p:nvPr>
+            <p:ph type="title"/>
+          </p:nvPr>
+        </p:nvSpPr>
+        <p:spPr/>
+        <p:txBody>
+          <a:bodyPr/>
+          <a:lstStyle/>
+          <a:p>
+            <a:r>
+              <a:rPr lang="de-DE" dirty="0"/>
+              <a:t>Extra: Sentiment </a:t>
+            </a:r>
+            <a:r>
+              <a:rPr lang="de-DE" dirty="0" err="1"/>
+              <a:t>analysis</a:t>
+            </a:r>
+            <a:endParaRPr lang="en-US" dirty="0"/>
+          </a:p>
+        </p:txBody>
+      </p:sp>
+      <p:sp>
+        <p:nvSpPr>
+          <p:cNvPr id="3" name="Content Placeholder 2">
+            <a:extLst>
+              <a:ext uri="{FF2B5EF4-FFF2-40B4-BE49-F238E27FC236}">
+                <a16:creationId xmlns:a16="http://schemas.microsoft.com/office/drawing/2014/main" id="{9EB75E72-C861-3AF2-ABB4-605E65368ABC}"/>
+              </a:ext>
+            </a:extLst>
+          </p:cNvPr>
+          <p:cNvSpPr>
+            <a:spLocks noGrp="1"/>
+          </p:cNvSpPr>
+          <p:nvPr>
+            <p:ph idx="1"/>
+          </p:nvPr>
+        </p:nvSpPr>
+        <p:spPr>
+          <a:xfrm>
+            <a:off x="838200" y="1690688"/>
+            <a:ext cx="10515600" cy="4351338"/>
+          </a:xfrm>
+        </p:spPr>
+        <p:txBody>
+          <a:bodyPr>
+            <a:normAutofit fontScale="92500" lnSpcReduction="10000"/>
+          </a:bodyPr>
+          <a:lstStyle/>
+          <a:p>
+            <a:r>
+              <a:rPr lang="de-DE" dirty="0"/>
+              <a:t>Access APIs </a:t>
+            </a:r>
+            <a:r>
+              <a:rPr lang="de-DE" dirty="0" err="1"/>
+              <a:t>of</a:t>
+            </a:r>
+            <a:r>
+              <a:rPr lang="de-DE" dirty="0"/>
+              <a:t> </a:t>
+            </a:r>
+            <a:r>
+              <a:rPr lang="de-DE" dirty="0" err="1"/>
+              <a:t>two</a:t>
+            </a:r>
+            <a:r>
+              <a:rPr lang="de-DE" dirty="0"/>
+              <a:t> LLMs </a:t>
+            </a:r>
+            <a:r>
+              <a:rPr lang="de-DE" dirty="0" err="1"/>
+              <a:t>to</a:t>
+            </a:r>
+            <a:r>
+              <a:rPr lang="de-DE" dirty="0"/>
+              <a:t> do </a:t>
+            </a:r>
+            <a:r>
+              <a:rPr lang="de-DE" dirty="0" err="1"/>
+              <a:t>sentiment</a:t>
+            </a:r>
+            <a:r>
+              <a:rPr lang="de-DE" dirty="0"/>
+              <a:t> </a:t>
+            </a:r>
+            <a:r>
+              <a:rPr lang="de-DE" dirty="0" err="1"/>
+              <a:t>analysis</a:t>
+            </a:r>
+            <a:r>
+              <a:rPr lang="de-DE" dirty="0"/>
+              <a:t> on </a:t>
+            </a:r>
+            <a:r>
+              <a:rPr lang="de-DE" dirty="0" err="1"/>
+              <a:t>daily</a:t>
+            </a:r>
+            <a:r>
+              <a:rPr lang="de-DE" dirty="0"/>
+              <a:t> </a:t>
+            </a:r>
+            <a:r>
+              <a:rPr lang="de-DE" dirty="0" err="1"/>
+              <a:t>basis</a:t>
+            </a:r>
+            <a:endParaRPr lang="de-DE" dirty="0"/>
+          </a:p>
+          <a:p>
+            <a:pPr lvl="1"/>
+            <a:r>
+              <a:rPr lang="de-DE" dirty="0"/>
+              <a:t>Google Gemini („</a:t>
+            </a:r>
+            <a:r>
+              <a:rPr lang="de-DE" dirty="0" err="1"/>
+              <a:t>allrounder</a:t>
+            </a:r>
+            <a:r>
+              <a:rPr lang="de-DE" dirty="0"/>
+              <a:t>“)</a:t>
+            </a:r>
+          </a:p>
+          <a:p>
+            <a:pPr lvl="1"/>
+            <a:r>
+              <a:rPr lang="de-DE" dirty="0" err="1"/>
+              <a:t>Perplexity</a:t>
+            </a:r>
+            <a:r>
+              <a:rPr lang="de-DE" dirty="0"/>
+              <a:t> (</a:t>
+            </a:r>
+            <a:r>
+              <a:rPr lang="de-DE" dirty="0" err="1"/>
+              <a:t>focused</a:t>
+            </a:r>
+            <a:r>
+              <a:rPr lang="de-DE" dirty="0"/>
+              <a:t> on real-time </a:t>
+            </a:r>
+            <a:r>
+              <a:rPr lang="de-DE" dirty="0" err="1"/>
+              <a:t>information</a:t>
+            </a:r>
+            <a:r>
+              <a:rPr lang="de-DE" dirty="0"/>
+              <a:t>)</a:t>
+            </a:r>
+          </a:p>
+          <a:p>
+            <a:r>
+              <a:rPr lang="en-US" dirty="0"/>
+              <a:t>Prompt: “Please give me an assessment of Meta shares (ISIN: US30303M1027) based on current news within the past 7 days, using at least 6 reputable financial sources. Use sentiment analysis and any major events impacting the stock. Rate on a scale of 1-100 (1 very poor, 100 very good). Return only a single int as the answer. ”</a:t>
+            </a:r>
+          </a:p>
+          <a:p>
+            <a:r>
+              <a:rPr lang="en-US" dirty="0"/>
+              <a:t>Returns .csv file</a:t>
+            </a:r>
+          </a:p>
+          <a:p>
+            <a:endParaRPr lang="en-US" dirty="0"/>
+          </a:p>
+          <a:p>
+            <a:r>
+              <a:rPr lang="en-US" dirty="0"/>
+              <a:t>Could be integrated for future modelling, if enough data is available</a:t>
+            </a:r>
+          </a:p>
+        </p:txBody>
+      </p:sp>
+      <p:pic>
+        <p:nvPicPr>
+          <p:cNvPr id="5" name="Grafik 4">
+            <a:extLst>
+              <a:ext uri="{FF2B5EF4-FFF2-40B4-BE49-F238E27FC236}">
+                <a16:creationId xmlns:a16="http://schemas.microsoft.com/office/drawing/2014/main" id="{AE33749E-D573-F128-81F0-3D66D1C07FBB}"/>
+              </a:ext>
+            </a:extLst>
+          </p:cNvPr>
+          <p:cNvPicPr>
+            <a:picLocks noChangeAspect="1"/>
+          </p:cNvPicPr>
+          <p:nvPr/>
+        </p:nvPicPr>
+        <p:blipFill>
+          <a:blip r:embed="rId2"/>
+          <a:stretch>
+            <a:fillRect/>
+          </a:stretch>
+        </p:blipFill>
+        <p:spPr>
+          <a:xfrm>
+            <a:off x="3447776" y="4520560"/>
+            <a:ext cx="3924848" cy="790685"/>
+          </a:xfrm>
+          <a:prstGeom prst="rect">
+            <a:avLst/>
+          </a:prstGeom>
+        </p:spPr>
+      </p:pic>
+    </p:spTree>
+    <p:extLst>
+      <p:ext uri="{BB962C8B-B14F-4D97-AF65-F5344CB8AC3E}">
+        <p14:creationId xmlns:p14="http://schemas.microsoft.com/office/powerpoint/2010/main" val="862690193"/>
+      </p:ext>
+    </p:extLst>
+  </p:cSld>
+  <p:clrMapOvr>
+    <a:masterClrMapping/>
+  </p:clrMapOvr>
+</p:sld>
+</file>
+
+<file path=ppt/slides/slide26.xml><?xml version="1.0" encoding="utf-8"?>
+<p:sld xmlns:a="http://schemas.openxmlformats.org/drawingml/2006/main" xmlns:r="http://schemas.openxmlformats.org/officeDocument/2006/relationships" xmlns:p="http://schemas.openxmlformats.org/presentationml/2006/main">
+  <p:cSld>
+    <p:spTree>
+      <p:nvGrpSpPr>
+        <p:cNvPr id="1" name="">
+          <a:extLst>
+            <a:ext uri="{FF2B5EF4-FFF2-40B4-BE49-F238E27FC236}">
+              <a16:creationId xmlns:a16="http://schemas.microsoft.com/office/drawing/2014/main" id="{118968EC-0DF5-454A-29F0-06E7F94B5885}"/>
+            </a:ext>
+          </a:extLst>
+        </p:cNvPr>
+        <p:cNvGrpSpPr/>
+        <p:nvPr/>
+      </p:nvGrpSpPr>
+      <p:grpSpPr>
+        <a:xfrm>
+          <a:off x="0" y="0"/>
+          <a:ext cx="0" cy="0"/>
+          <a:chOff x="0" y="0"/>
+          <a:chExt cx="0" cy="0"/>
+        </a:xfrm>
+      </p:grpSpPr>
+      <p:sp>
+        <p:nvSpPr>
+          <p:cNvPr id="2" name="Title 1">
+            <a:extLst>
+              <a:ext uri="{FF2B5EF4-FFF2-40B4-BE49-F238E27FC236}">
+                <a16:creationId xmlns:a16="http://schemas.microsoft.com/office/drawing/2014/main" id="{437F05CF-EAAC-5EC6-9A1A-47B26BE9E174}"/>
+              </a:ext>
+            </a:extLst>
+          </p:cNvPr>
+          <p:cNvSpPr>
+            <a:spLocks noGrp="1"/>
+          </p:cNvSpPr>
+          <p:nvPr>
+            <p:ph type="title"/>
+          </p:nvPr>
+        </p:nvSpPr>
+        <p:spPr/>
+        <p:txBody>
+          <a:bodyPr/>
+          <a:lstStyle/>
+          <a:p>
+            <a:r>
+              <a:rPr lang="de-DE" dirty="0"/>
+              <a:t>Outlook</a:t>
+            </a:r>
+            <a:endParaRPr lang="en-US" dirty="0"/>
+          </a:p>
+        </p:txBody>
+      </p:sp>
+      <p:sp>
+        <p:nvSpPr>
+          <p:cNvPr id="3" name="Content Placeholder 2">
+            <a:extLst>
+              <a:ext uri="{FF2B5EF4-FFF2-40B4-BE49-F238E27FC236}">
+                <a16:creationId xmlns:a16="http://schemas.microsoft.com/office/drawing/2014/main" id="{57E2B12A-B674-8F51-3ADD-BF70D5C1906C}"/>
+              </a:ext>
+            </a:extLst>
+          </p:cNvPr>
+          <p:cNvSpPr>
+            <a:spLocks noGrp="1"/>
+          </p:cNvSpPr>
+          <p:nvPr>
+            <p:ph idx="1"/>
+          </p:nvPr>
+        </p:nvSpPr>
+        <p:spPr>
+          <a:xfrm>
+            <a:off x="838200" y="1690688"/>
+            <a:ext cx="10515600" cy="4351338"/>
+          </a:xfrm>
+        </p:spPr>
+        <p:txBody>
+          <a:bodyPr>
+            <a:normAutofit/>
+          </a:bodyPr>
+          <a:lstStyle/>
+          <a:p>
+            <a:r>
+              <a:rPr lang="en-US" dirty="0"/>
+              <a:t>Code optimization </a:t>
+            </a:r>
+            <a:r>
+              <a:rPr lang="en-US" dirty="0">
+                <a:sym typeface="Wingdings" panose="05000000000000000000" pitchFamily="2" charset="2"/>
+              </a:rPr>
+              <a:t> </a:t>
+            </a:r>
+            <a:r>
+              <a:rPr lang="en-US" dirty="0"/>
+              <a:t>Move parts of code used more frequently into class</a:t>
+            </a:r>
+          </a:p>
+          <a:p>
+            <a:endParaRPr lang="en-US" dirty="0"/>
+          </a:p>
+        </p:txBody>
+      </p:sp>
+    </p:spTree>
+    <p:extLst>
+      <p:ext uri="{BB962C8B-B14F-4D97-AF65-F5344CB8AC3E}">
+        <p14:creationId xmlns:p14="http://schemas.microsoft.com/office/powerpoint/2010/main" val="2433222471"/>
       </p:ext>
     </p:extLst>
   </p:cSld>
@@ -7425,8 +8285,12 @@
           <a:lstStyle/>
           <a:p>
             <a:r>
-              <a:rPr lang="de-DE" dirty="0"/>
-              <a:t>Optional </a:t>
+              <a:rPr lang="de-DE" dirty="0" err="1"/>
+              <a:t>Optionally</a:t>
+            </a:r>
+            <a:r>
+              <a:rPr lang="de-DE" dirty="0"/>
+              <a:t> </a:t>
             </a:r>
             <a:r>
               <a:rPr lang="de-DE" dirty="0" err="1"/>
@@ -7467,8 +8331,8 @@
         </p:nvSpPr>
         <p:spPr>
           <a:xfrm>
-            <a:off x="1023042" y="1539089"/>
-            <a:ext cx="6781045" cy="369332"/>
+            <a:off x="838200" y="1538714"/>
+            <a:ext cx="7562158" cy="369332"/>
           </a:xfrm>
           <a:prstGeom prst="rect">
             <a:avLst/>
@@ -7491,7 +8355,35 @@
             </a:r>
             <a:r>
               <a:rPr lang="de-DE" dirty="0"/>
-              <a:t> from yfinance.com</a:t>
+              <a:t> </a:t>
+            </a:r>
+            <a:r>
+              <a:rPr lang="de-DE" dirty="0" err="1"/>
+              <a:t>from</a:t>
+            </a:r>
+            <a:r>
+              <a:rPr lang="de-DE" dirty="0"/>
+              <a:t> finance.yahoo.com </a:t>
+            </a:r>
+            <a:r>
+              <a:rPr lang="de-DE" dirty="0" err="1"/>
+              <a:t>using</a:t>
+            </a:r>
+            <a:r>
+              <a:rPr lang="de-DE" dirty="0"/>
+              <a:t> Python </a:t>
+            </a:r>
+            <a:r>
+              <a:rPr lang="de-DE" dirty="0" err="1"/>
+              <a:t>yfinance</a:t>
+            </a:r>
+            <a:r>
+              <a:rPr lang="de-DE" dirty="0"/>
+              <a:t> </a:t>
+            </a:r>
+            <a:r>
+              <a:rPr lang="de-DE" dirty="0" err="1"/>
+              <a:t>package</a:t>
             </a:r>
             <a:endParaRPr lang="en-US" dirty="0"/>
           </a:p>
@@ -7515,6 +8407,110 @@
   <p:cSld>
     <p:spTree>
       <p:nvGrpSpPr>
+        <p:cNvPr id="1" name="">
+          <a:extLst>
+            <a:ext uri="{FF2B5EF4-FFF2-40B4-BE49-F238E27FC236}">
+              <a16:creationId xmlns:a16="http://schemas.microsoft.com/office/drawing/2014/main" id="{61DD7428-C6FE-949D-575D-CDBD0A49AC07}"/>
+            </a:ext>
+          </a:extLst>
+        </p:cNvPr>
+        <p:cNvGrpSpPr/>
+        <p:nvPr/>
+      </p:nvGrpSpPr>
+      <p:grpSpPr>
+        <a:xfrm>
+          <a:off x="0" y="0"/>
+          <a:ext cx="0" cy="0"/>
+          <a:chOff x="0" y="0"/>
+          <a:chExt cx="0" cy="0"/>
+        </a:xfrm>
+      </p:grpSpPr>
+      <p:sp>
+        <p:nvSpPr>
+          <p:cNvPr id="2" name="Title 1">
+            <a:extLst>
+              <a:ext uri="{FF2B5EF4-FFF2-40B4-BE49-F238E27FC236}">
+                <a16:creationId xmlns:a16="http://schemas.microsoft.com/office/drawing/2014/main" id="{5D6E4F12-6683-EFAB-4898-4F36C9B89FEC}"/>
+              </a:ext>
+            </a:extLst>
+          </p:cNvPr>
+          <p:cNvSpPr>
+            <a:spLocks noGrp="1"/>
+          </p:cNvSpPr>
+          <p:nvPr>
+            <p:ph type="title"/>
+          </p:nvPr>
+        </p:nvSpPr>
+        <p:spPr>
+          <a:xfrm>
+            <a:off x="838200" y="-37852"/>
+            <a:ext cx="10515600" cy="1325563"/>
+          </a:xfrm>
+        </p:spPr>
+        <p:txBody>
+          <a:bodyPr/>
+          <a:lstStyle/>
+          <a:p>
+            <a:r>
+              <a:rPr lang="de-DE" dirty="0"/>
+              <a:t>General </a:t>
+            </a:r>
+            <a:r>
+              <a:rPr lang="de-DE" dirty="0" err="1"/>
+              <a:t>structure</a:t>
+            </a:r>
+            <a:endParaRPr lang="en-US" dirty="0"/>
+          </a:p>
+        </p:txBody>
+      </p:sp>
+      <p:pic>
+        <p:nvPicPr>
+          <p:cNvPr id="13" name="Grafik 12">
+            <a:extLst>
+              <a:ext uri="{FF2B5EF4-FFF2-40B4-BE49-F238E27FC236}">
+                <a16:creationId xmlns:a16="http://schemas.microsoft.com/office/drawing/2014/main" id="{AA9E7CCE-B29F-6DEF-8FFF-5FDC77EA31F2}"/>
+              </a:ext>
+            </a:extLst>
+          </p:cNvPr>
+          <p:cNvPicPr>
+            <a:picLocks noChangeAspect="1"/>
+          </p:cNvPicPr>
+          <p:nvPr/>
+        </p:nvPicPr>
+        <p:blipFill>
+          <a:blip r:embed="rId2"/>
+          <a:stretch>
+            <a:fillRect/>
+          </a:stretch>
+        </p:blipFill>
+        <p:spPr>
+          <a:xfrm>
+            <a:off x="354105" y="1016777"/>
+            <a:ext cx="11483790" cy="5341690"/>
+          </a:xfrm>
+          <a:prstGeom prst="rect">
+            <a:avLst/>
+          </a:prstGeom>
+        </p:spPr>
+      </p:pic>
+    </p:spTree>
+    <p:extLst>
+      <p:ext uri="{BB962C8B-B14F-4D97-AF65-F5344CB8AC3E}">
+        <p14:creationId xmlns:p14="http://schemas.microsoft.com/office/powerpoint/2010/main" val="2886565103"/>
+      </p:ext>
+    </p:extLst>
+  </p:cSld>
+  <p:clrMapOvr>
+    <a:masterClrMapping/>
+  </p:clrMapOvr>
+</p:sld>
+</file>
+
+<file path=ppt/slides/slide5.xml><?xml version="1.0" encoding="utf-8"?>
+<p:sld xmlns:a="http://schemas.openxmlformats.org/drawingml/2006/main" xmlns:r="http://schemas.openxmlformats.org/officeDocument/2006/relationships" xmlns:p="http://schemas.openxmlformats.org/presentationml/2006/main">
+  <p:cSld>
+    <p:spTree>
+      <p:nvGrpSpPr>
         <p:cNvPr id="1" name=""/>
         <p:cNvGrpSpPr/>
         <p:nvPr/>
@@ -7650,7 +8646,7 @@
             </a:r>
             <a:r>
               <a:rPr lang="de-DE" dirty="0" err="1"/>
-              <a:t>traiding</a:t>
+              <a:t>trading</a:t>
             </a:r>
             <a:r>
               <a:rPr lang="de-DE" dirty="0"/>
@@ -7716,7 +8712,7 @@
             </a:r>
             <a:r>
               <a:rPr lang="de-DE" dirty="0" err="1"/>
-              <a:t>periode</a:t>
+              <a:t>period</a:t>
             </a:r>
             <a:r>
               <a:rPr lang="de-DE" dirty="0"/>
@@ -7730,6 +8726,36 @@
           </a:p>
         </p:txBody>
       </p:sp>
+      <p:pic>
+        <p:nvPicPr>
+          <p:cNvPr id="7" name="Grafik 6">
+            <a:extLst>
+              <a:ext uri="{FF2B5EF4-FFF2-40B4-BE49-F238E27FC236}">
+                <a16:creationId xmlns:a16="http://schemas.microsoft.com/office/drawing/2014/main" id="{A877C498-979A-6625-D3A6-2C773F8E96C6}"/>
+              </a:ext>
+            </a:extLst>
+          </p:cNvPr>
+          <p:cNvPicPr>
+            <a:picLocks noChangeAspect="1"/>
+          </p:cNvPicPr>
+          <p:nvPr/>
+        </p:nvPicPr>
+        <p:blipFill>
+          <a:blip r:embed="rId2"/>
+          <a:stretch>
+            <a:fillRect/>
+          </a:stretch>
+        </p:blipFill>
+        <p:spPr>
+          <a:xfrm>
+            <a:off x="1276769" y="3939810"/>
+            <a:ext cx="9164329" cy="2629267"/>
+          </a:xfrm>
+          <a:prstGeom prst="rect">
+            <a:avLst/>
+          </a:prstGeom>
+        </p:spPr>
+      </p:pic>
     </p:spTree>
     <p:extLst>
       <p:ext uri="{BB962C8B-B14F-4D97-AF65-F5344CB8AC3E}">
@@ -7743,7 +8769,7 @@
 </p:sld>
 </file>
 
-<file path=ppt/slides/slide5.xml><?xml version="1.0" encoding="utf-8"?>
+<file path=ppt/slides/slide6.xml><?xml version="1.0" encoding="utf-8"?>
 <p:sld xmlns:a="http://schemas.openxmlformats.org/drawingml/2006/main" xmlns:r="http://schemas.openxmlformats.org/officeDocument/2006/relationships" xmlns:p="http://schemas.openxmlformats.org/presentationml/2006/main">
   <p:cSld>
     <p:spTree>
@@ -7958,7 +8984,7 @@
 </p:sld>
 </file>
 
-<file path=ppt/slides/slide6.xml><?xml version="1.0" encoding="utf-8"?>
+<file path=ppt/slides/slide7.xml><?xml version="1.0" encoding="utf-8"?>
 <p:sld xmlns:a="http://schemas.openxmlformats.org/drawingml/2006/main" xmlns:r="http://schemas.openxmlformats.org/officeDocument/2006/relationships" xmlns:p="http://schemas.openxmlformats.org/presentationml/2006/main">
   <p:cSld>
     <p:spTree>
@@ -8146,7 +9172,7 @@
 </p:sld>
 </file>
 
-<file path=ppt/slides/slide7.xml><?xml version="1.0" encoding="utf-8"?>
+<file path=ppt/slides/slide8.xml><?xml version="1.0" encoding="utf-8"?>
 <p:sld xmlns:a="http://schemas.openxmlformats.org/drawingml/2006/main" xmlns:r="http://schemas.openxmlformats.org/officeDocument/2006/relationships" xmlns:p="http://schemas.openxmlformats.org/presentationml/2006/main">
   <p:cSld>
     <p:spTree>
@@ -8322,7 +9348,7 @@
 </p:sld>
 </file>
 
-<file path=ppt/slides/slide8.xml><?xml version="1.0" encoding="utf-8"?>
+<file path=ppt/slides/slide9.xml><?xml version="1.0" encoding="utf-8"?>
 <p:sld xmlns:a="http://schemas.openxmlformats.org/drawingml/2006/main" xmlns:r="http://schemas.openxmlformats.org/officeDocument/2006/relationships" xmlns:p="http://schemas.openxmlformats.org/presentationml/2006/main">
   <p:cSld>
     <p:spTree>
@@ -8525,188 +9551,6 @@
     <p:extLst>
       <p:ext uri="{BB962C8B-B14F-4D97-AF65-F5344CB8AC3E}">
         <p14:creationId xmlns:p14="http://schemas.microsoft.com/office/powerpoint/2010/main" val="2578081995"/>
-      </p:ext>
-    </p:extLst>
-  </p:cSld>
-  <p:clrMapOvr>
-    <a:masterClrMapping/>
-  </p:clrMapOvr>
-</p:sld>
-</file>
-
-<file path=ppt/slides/slide9.xml><?xml version="1.0" encoding="utf-8"?>
-<p:sld xmlns:a="http://schemas.openxmlformats.org/drawingml/2006/main" xmlns:r="http://schemas.openxmlformats.org/officeDocument/2006/relationships" xmlns:p="http://schemas.openxmlformats.org/presentationml/2006/main">
-  <p:cSld>
-    <p:spTree>
-      <p:nvGrpSpPr>
-        <p:cNvPr id="1" name="">
-          <a:extLst>
-            <a:ext uri="{FF2B5EF4-FFF2-40B4-BE49-F238E27FC236}">
-              <a16:creationId xmlns:a16="http://schemas.microsoft.com/office/drawing/2014/main" id="{F3DA1B15-20D9-6028-5BAF-669BBDCD880A}"/>
-            </a:ext>
-          </a:extLst>
-        </p:cNvPr>
-        <p:cNvGrpSpPr/>
-        <p:nvPr/>
-      </p:nvGrpSpPr>
-      <p:grpSpPr>
-        <a:xfrm>
-          <a:off x="0" y="0"/>
-          <a:ext cx="0" cy="0"/>
-          <a:chOff x="0" y="0"/>
-          <a:chExt cx="0" cy="0"/>
-        </a:xfrm>
-      </p:grpSpPr>
-      <p:sp>
-        <p:nvSpPr>
-          <p:cNvPr id="2" name="Title 1">
-            <a:extLst>
-              <a:ext uri="{FF2B5EF4-FFF2-40B4-BE49-F238E27FC236}">
-                <a16:creationId xmlns:a16="http://schemas.microsoft.com/office/drawing/2014/main" id="{C6B46AD9-0A4A-10BA-4AC3-B6BDF04B53C7}"/>
-              </a:ext>
-            </a:extLst>
-          </p:cNvPr>
-          <p:cNvSpPr>
-            <a:spLocks noGrp="1"/>
-          </p:cNvSpPr>
-          <p:nvPr>
-            <p:ph type="title"/>
-          </p:nvPr>
-        </p:nvSpPr>
-        <p:spPr/>
-        <p:txBody>
-          <a:bodyPr/>
-          <a:lstStyle/>
-          <a:p>
-            <a:r>
-              <a:rPr lang="de-DE" dirty="0"/>
-              <a:t>Applied </a:t>
-            </a:r>
-            <a:r>
-              <a:rPr lang="de-DE" dirty="0" err="1"/>
-              <a:t>models</a:t>
-            </a:r>
-            <a:r>
-              <a:rPr lang="de-DE" dirty="0"/>
-              <a:t> </a:t>
-            </a:r>
-            <a:endParaRPr lang="en-US" dirty="0"/>
-          </a:p>
-        </p:txBody>
-      </p:sp>
-      <p:sp>
-        <p:nvSpPr>
-          <p:cNvPr id="3" name="Content Placeholder 2">
-            <a:extLst>
-              <a:ext uri="{FF2B5EF4-FFF2-40B4-BE49-F238E27FC236}">
-                <a16:creationId xmlns:a16="http://schemas.microsoft.com/office/drawing/2014/main" id="{F7176549-20BF-5B2D-B668-2F52ABBC509B}"/>
-              </a:ext>
-            </a:extLst>
-          </p:cNvPr>
-          <p:cNvSpPr>
-            <a:spLocks noGrp="1"/>
-          </p:cNvSpPr>
-          <p:nvPr>
-            <p:ph idx="1"/>
-          </p:nvPr>
-        </p:nvSpPr>
-        <p:spPr/>
-        <p:txBody>
-          <a:bodyPr>
-            <a:normAutofit/>
-          </a:bodyPr>
-          <a:lstStyle/>
-          <a:p>
-            <a:r>
-              <a:rPr lang="de-DE" dirty="0"/>
-              <a:t>First </a:t>
-            </a:r>
-            <a:r>
-              <a:rPr lang="de-DE" dirty="0" err="1"/>
-              <a:t>step</a:t>
-            </a:r>
-            <a:r>
-              <a:rPr lang="de-DE" dirty="0"/>
-              <a:t>: </a:t>
-            </a:r>
-            <a:r>
-              <a:rPr lang="de-DE" dirty="0" err="1"/>
-              <a:t>scale</a:t>
-            </a:r>
-            <a:r>
-              <a:rPr lang="de-DE" dirty="0"/>
-              <a:t> </a:t>
-            </a:r>
-            <a:r>
-              <a:rPr lang="de-DE" dirty="0" err="1"/>
-              <a:t>data</a:t>
-            </a:r>
-            <a:r>
-              <a:rPr lang="de-DE" dirty="0"/>
-              <a:t> </a:t>
-            </a:r>
-            <a:r>
-              <a:rPr lang="de-DE" dirty="0" err="1"/>
-              <a:t>using</a:t>
-            </a:r>
-            <a:r>
-              <a:rPr lang="de-DE" dirty="0"/>
-              <a:t> </a:t>
-            </a:r>
-            <a:r>
-              <a:rPr lang="de-DE" dirty="0" err="1"/>
-              <a:t>MinMaxScaler</a:t>
-            </a:r>
-            <a:endParaRPr lang="en-US" dirty="0"/>
-          </a:p>
-          <a:p>
-            <a:r>
-              <a:rPr lang="en-US" dirty="0"/>
-              <a:t>Convolutional Neural Network (CNN)</a:t>
-            </a:r>
-          </a:p>
-          <a:p>
-            <a:pPr marL="0" indent="0">
-              <a:buNone/>
-            </a:pPr>
-            <a:endParaRPr lang="en-US" dirty="0"/>
-          </a:p>
-        </p:txBody>
-      </p:sp>
-      <p:pic>
-        <p:nvPicPr>
-          <p:cNvPr id="5" name="Picture 4">
-            <a:extLst>
-              <a:ext uri="{FF2B5EF4-FFF2-40B4-BE49-F238E27FC236}">
-                <a16:creationId xmlns:a16="http://schemas.microsoft.com/office/drawing/2014/main" id="{B0F9667F-9092-00CA-870E-E0511818930D}"/>
-              </a:ext>
-            </a:extLst>
-          </p:cNvPr>
-          <p:cNvPicPr>
-            <a:picLocks noChangeAspect="1"/>
-          </p:cNvPicPr>
-          <p:nvPr/>
-        </p:nvPicPr>
-        <p:blipFill>
-          <a:blip r:embed="rId2"/>
-          <a:stretch>
-            <a:fillRect/>
-          </a:stretch>
-        </p:blipFill>
-        <p:spPr>
-          <a:xfrm>
-            <a:off x="1150261" y="2898382"/>
-            <a:ext cx="10344150" cy="2600325"/>
-          </a:xfrm>
-          <a:prstGeom prst="rect">
-            <a:avLst/>
-          </a:prstGeom>
-        </p:spPr>
-      </p:pic>
-    </p:spTree>
-    <p:extLst>
-      <p:ext uri="{BB962C8B-B14F-4D97-AF65-F5344CB8AC3E}">
-        <p14:creationId xmlns:p14="http://schemas.microsoft.com/office/powerpoint/2010/main" val="2589736892"/>
       </p:ext>
     </p:extLst>
   </p:cSld>

</xml_diff>